<commit_message>
update session 3 presentation
</commit_message>
<xml_diff>
--- a/presentations/session-3-building-iot-products-programming-aspects.pptx
+++ b/presentations/session-3-building-iot-products-programming-aspects.pptx
@@ -5,21 +5,35 @@
     <p:sldMasterId id="2147483648" r:id="rId1"/>
   </p:sldMasterIdLst>
   <p:notesMasterIdLst>
-    <p:notesMasterId r:id="rId14"/>
+    <p:notesMasterId r:id="rId28"/>
   </p:notesMasterIdLst>
   <p:sldIdLst>
     <p:sldId id="263" r:id="rId2"/>
     <p:sldId id="433" r:id="rId3"/>
     <p:sldId id="506" r:id="rId4"/>
     <p:sldId id="507" r:id="rId5"/>
-    <p:sldId id="508" r:id="rId6"/>
-    <p:sldId id="509" r:id="rId7"/>
-    <p:sldId id="515" r:id="rId8"/>
-    <p:sldId id="516" r:id="rId9"/>
-    <p:sldId id="513" r:id="rId10"/>
-    <p:sldId id="514" r:id="rId11"/>
-    <p:sldId id="512" r:id="rId12"/>
-    <p:sldId id="352" r:id="rId13"/>
+    <p:sldId id="517" r:id="rId6"/>
+    <p:sldId id="518" r:id="rId7"/>
+    <p:sldId id="516" r:id="rId8"/>
+    <p:sldId id="508" r:id="rId9"/>
+    <p:sldId id="509" r:id="rId10"/>
+    <p:sldId id="515" r:id="rId11"/>
+    <p:sldId id="513" r:id="rId12"/>
+    <p:sldId id="519" r:id="rId13"/>
+    <p:sldId id="512" r:id="rId14"/>
+    <p:sldId id="520" r:id="rId15"/>
+    <p:sldId id="521" r:id="rId16"/>
+    <p:sldId id="522" r:id="rId17"/>
+    <p:sldId id="523" r:id="rId18"/>
+    <p:sldId id="524" r:id="rId19"/>
+    <p:sldId id="525" r:id="rId20"/>
+    <p:sldId id="526" r:id="rId21"/>
+    <p:sldId id="527" r:id="rId22"/>
+    <p:sldId id="528" r:id="rId23"/>
+    <p:sldId id="530" r:id="rId24"/>
+    <p:sldId id="529" r:id="rId25"/>
+    <p:sldId id="531" r:id="rId26"/>
+    <p:sldId id="352" r:id="rId27"/>
   </p:sldIdLst>
   <p:sldSz cx="12192000" cy="6858000"/>
   <p:notesSz cx="6797675" cy="9874250"/>
@@ -636,7 +650,7 @@
           <a:p>
             <a:fld id="{2F6F93F9-6E01-423B-ABB3-8FB3B0651941}" type="slidenum">
               <a:rPr lang="en-US" smtClean="0"/>
-              <a:t>10</a:t>
+              <a:t>13</a:t>
             </a:fld>
             <a:endParaRPr lang="en-US"/>
           </a:p>
@@ -720,7 +734,7 @@
           <a:p>
             <a:fld id="{2F6F93F9-6E01-423B-ABB3-8FB3B0651941}" type="slidenum">
               <a:rPr lang="en-US" smtClean="0"/>
-              <a:t>11</a:t>
+              <a:t>14</a:t>
             </a:fld>
             <a:endParaRPr lang="en-US"/>
           </a:p>
@@ -1056,7 +1070,7 @@
           <a:p>
             <a:fld id="{2F6F93F9-6E01-423B-ABB3-8FB3B0651941}" type="slidenum">
               <a:rPr lang="en-US" smtClean="0"/>
-              <a:t>5</a:t>
+              <a:t>7</a:t>
             </a:fld>
             <a:endParaRPr lang="en-US"/>
           </a:p>
@@ -1140,7 +1154,7 @@
           <a:p>
             <a:fld id="{2F6F93F9-6E01-423B-ABB3-8FB3B0651941}" type="slidenum">
               <a:rPr lang="en-US" smtClean="0"/>
-              <a:t>6</a:t>
+              <a:t>8</a:t>
             </a:fld>
             <a:endParaRPr lang="en-US"/>
           </a:p>
@@ -1224,7 +1238,7 @@
           <a:p>
             <a:fld id="{2F6F93F9-6E01-423B-ABB3-8FB3B0651941}" type="slidenum">
               <a:rPr lang="en-US" smtClean="0"/>
-              <a:t>7</a:t>
+              <a:t>9</a:t>
             </a:fld>
             <a:endParaRPr lang="en-US"/>
           </a:p>
@@ -1308,7 +1322,7 @@
           <a:p>
             <a:fld id="{2F6F93F9-6E01-423B-ABB3-8FB3B0651941}" type="slidenum">
               <a:rPr lang="en-US" smtClean="0"/>
-              <a:t>8</a:t>
+              <a:t>10</a:t>
             </a:fld>
             <a:endParaRPr lang="en-US"/>
           </a:p>
@@ -1392,7 +1406,7 @@
           <a:p>
             <a:fld id="{2F6F93F9-6E01-423B-ABB3-8FB3B0651941}" type="slidenum">
               <a:rPr lang="en-US" smtClean="0"/>
-              <a:t>9</a:t>
+              <a:t>11</a:t>
             </a:fld>
             <a:endParaRPr lang="en-US"/>
           </a:p>
@@ -4249,78 +4263,74 @@
       </p:grpSpPr>
       <p:sp>
         <p:nvSpPr>
-          <p:cNvPr id="2" name="Rectangle 1"/>
-          <p:cNvSpPr/>
+          <p:cNvPr id="5" name="TextBox 4"/>
+          <p:cNvSpPr txBox="1"/>
           <p:nvPr/>
         </p:nvSpPr>
         <p:spPr>
           <a:xfrm>
-            <a:off x="4862348" y="2077015"/>
-            <a:ext cx="2569934" cy="369332"/>
-          </a:xfrm>
-          <a:prstGeom prst="rect">
-            <a:avLst/>
-          </a:prstGeom>
-        </p:spPr>
-        <p:txBody>
-          <a:bodyPr wrap="none">
+            <a:off x="1489855" y="1794919"/>
+            <a:ext cx="9196386" cy="1477328"/>
+          </a:xfrm>
+          <a:prstGeom prst="rect">
+            <a:avLst/>
+          </a:prstGeom>
+          <a:noFill/>
+        </p:spPr>
+        <p:txBody>
+          <a:bodyPr wrap="square" rtlCol="0">
             <a:spAutoFit/>
           </a:bodyPr>
           <a:lstStyle/>
           <a:p>
-            <a:r>
-              <a:rPr lang="en-US"/>
-              <a:t>https://micropython.org/</a:t>
-            </a:r>
-          </a:p>
-        </p:txBody>
-      </p:sp>
-      <p:sp>
-        <p:nvSpPr>
-          <p:cNvPr id="5" name="Rectangle 4"/>
-          <p:cNvSpPr/>
-          <p:nvPr/>
-        </p:nvSpPr>
-        <p:spPr>
-          <a:xfrm>
-            <a:off x="5065628" y="3244334"/>
-            <a:ext cx="2060743" cy="369332"/>
-          </a:xfrm>
-          <a:prstGeom prst="rect">
-            <a:avLst/>
-          </a:prstGeom>
-        </p:spPr>
-        <p:txBody>
-          <a:bodyPr wrap="none">
-            <a:spAutoFit/>
-          </a:bodyPr>
-          <a:lstStyle/>
-          <a:p>
-            <a:r>
-              <a:rPr lang="en-US"/>
-              <a:t>http://microbit.org/</a:t>
+            <a:endParaRPr lang="en-US" sz="3000" b="1" dirty="0">
+              <a:solidFill>
+                <a:schemeClr val="accent1"/>
+              </a:solidFill>
+              <a:latin typeface="Cambria" panose="02040503050406030204" pitchFamily="18" charset="0"/>
+            </a:endParaRPr>
+          </a:p>
+          <a:p>
+            <a:endParaRPr lang="en-US" sz="3000" b="1" dirty="0">
+              <a:solidFill>
+                <a:schemeClr val="accent1"/>
+              </a:solidFill>
+              <a:latin typeface="Cambria" panose="02040503050406030204" pitchFamily="18" charset="0"/>
+            </a:endParaRPr>
+          </a:p>
+          <a:p>
+            <a:r>
+              <a:rPr lang="en-US" sz="3000" b="1" dirty="0">
+                <a:solidFill>
+                  <a:schemeClr val="accent1"/>
+                </a:solidFill>
+                <a:latin typeface="Cambria" panose="02040503050406030204" pitchFamily="18" charset="0"/>
+              </a:rPr>
+              <a:t>IoT RAPID PROTOTYPING &amp; TRAINING</a:t>
             </a:r>
           </a:p>
         </p:txBody>
       </p:sp>
       <p:pic>
         <p:nvPicPr>
-          <p:cNvPr id="7" name="Picture 6"/>
+          <p:cNvPr id="6" name="Picture 5"/>
           <p:cNvPicPr>
             <a:picLocks noChangeAspect="1"/>
           </p:cNvPicPr>
           <p:nvPr/>
         </p:nvPicPr>
         <p:blipFill>
-          <a:blip r:embed="rId3"/>
+          <a:blip r:embed="rId3">
+            <a:alphaModFix amt="97000"/>
+          </a:blip>
           <a:stretch>
             <a:fillRect/>
           </a:stretch>
         </p:blipFill>
         <p:spPr>
           <a:xfrm>
-            <a:off x="3263806" y="1560125"/>
-            <a:ext cx="5080857" cy="3660742"/>
+            <a:off x="1605630" y="3394095"/>
+            <a:ext cx="2451100" cy="698500"/>
           </a:xfrm>
           <a:prstGeom prst="rect">
             <a:avLst/>
@@ -4330,7 +4340,7 @@
     </p:spTree>
     <p:extLst>
       <p:ext uri="{BB962C8B-B14F-4D97-AF65-F5344CB8AC3E}">
-        <p14:creationId xmlns:p14="http://schemas.microsoft.com/office/powerpoint/2010/main" val="3175072354"/>
+        <p14:creationId xmlns:p14="http://schemas.microsoft.com/office/powerpoint/2010/main" val="2992596021"/>
       </p:ext>
     </p:extLst>
   </p:cSld>
@@ -4378,7 +4388,7 @@
       </p:grpSpPr>
       <p:pic>
         <p:nvPicPr>
-          <p:cNvPr id="3" name="Picture 2"/>
+          <p:cNvPr id="7" name="Picture 6"/>
           <p:cNvPicPr>
             <a:picLocks noChangeAspect="1"/>
           </p:cNvPicPr>
@@ -4392,8 +4402,58 @@
         </p:blipFill>
         <p:spPr>
           <a:xfrm>
-            <a:off x="2679700" y="1168400"/>
-            <a:ext cx="6819900" cy="4521200"/>
+            <a:off x="1317480" y="2360670"/>
+            <a:ext cx="3389483" cy="2442112"/>
+          </a:xfrm>
+          <a:prstGeom prst="rect">
+            <a:avLst/>
+          </a:prstGeom>
+        </p:spPr>
+      </p:pic>
+      <p:pic>
+        <p:nvPicPr>
+          <p:cNvPr id="3" name="Picture 2"/>
+          <p:cNvPicPr>
+            <a:picLocks noChangeAspect="1"/>
+          </p:cNvPicPr>
+          <p:nvPr/>
+        </p:nvPicPr>
+        <p:blipFill>
+          <a:blip r:embed="rId4">
+            <a:alphaModFix amt="84000"/>
+          </a:blip>
+          <a:stretch>
+            <a:fillRect/>
+          </a:stretch>
+        </p:blipFill>
+        <p:spPr>
+          <a:xfrm>
+            <a:off x="1490173" y="854211"/>
+            <a:ext cx="2451100" cy="698500"/>
+          </a:xfrm>
+          <a:prstGeom prst="rect">
+            <a:avLst/>
+          </a:prstGeom>
+        </p:spPr>
+      </p:pic>
+      <p:pic>
+        <p:nvPicPr>
+          <p:cNvPr id="8" name="Picture 7"/>
+          <p:cNvPicPr>
+            <a:picLocks noChangeAspect="1"/>
+          </p:cNvPicPr>
+          <p:nvPr/>
+        </p:nvPicPr>
+        <p:blipFill>
+          <a:blip r:embed="rId5"/>
+          <a:stretch>
+            <a:fillRect/>
+          </a:stretch>
+        </p:blipFill>
+        <p:spPr>
+          <a:xfrm>
+            <a:off x="4833071" y="518072"/>
+            <a:ext cx="7374817" cy="4734157"/>
           </a:xfrm>
           <a:prstGeom prst="rect">
             <a:avLst/>
@@ -4403,7 +4463,7 @@
     </p:spTree>
     <p:extLst>
       <p:ext uri="{BB962C8B-B14F-4D97-AF65-F5344CB8AC3E}">
-        <p14:creationId xmlns:p14="http://schemas.microsoft.com/office/powerpoint/2010/main" val="3246652878"/>
+        <p14:creationId xmlns:p14="http://schemas.microsoft.com/office/powerpoint/2010/main" val="305623156"/>
       </p:ext>
     </p:extLst>
   </p:cSld>
@@ -4451,44 +4511,65 @@
       </p:grpSpPr>
       <p:sp>
         <p:nvSpPr>
-          <p:cNvPr id="2" name="Title 1"/>
-          <p:cNvSpPr>
-            <a:spLocks noGrp="1"/>
-          </p:cNvSpPr>
-          <p:nvPr>
-            <p:ph type="title"/>
-          </p:nvPr>
-        </p:nvSpPr>
-        <p:spPr>
-          <a:xfrm>
-            <a:off x="1058333" y="2874439"/>
-            <a:ext cx="5036820" cy="807721"/>
-          </a:xfrm>
-        </p:spPr>
-        <p:txBody>
-          <a:bodyPr/>
-          <a:lstStyle/>
-          <a:p>
-            <a:r>
-              <a:rPr lang="en-US" dirty="0" smtClean="0">
-                <a:solidFill>
-                  <a:schemeClr val="accent1"/>
-                </a:solidFill>
+          <p:cNvPr id="6" name="Rectangle 5">
+            <a:hlinkClick r:id="rId2"/>
+          </p:cNvPr>
+          <p:cNvSpPr/>
+          <p:nvPr/>
+        </p:nvSpPr>
+        <p:spPr>
+          <a:xfrm>
+            <a:off x="187218" y="6299927"/>
+            <a:ext cx="9305962" cy="369332"/>
+          </a:xfrm>
+          <a:prstGeom prst="rect">
+            <a:avLst/>
+          </a:prstGeom>
+        </p:spPr>
+        <p:txBody>
+          <a:bodyPr wrap="square">
+            <a:spAutoFit/>
+          </a:bodyPr>
+          <a:lstStyle/>
+          <a:p>
+            <a:r>
+              <a:rPr lang="en-US">
+                <a:hlinkClick r:id="rId2"/>
               </a:rPr>
-              <a:t>THANK YOU</a:t>
-            </a:r>
-            <a:endParaRPr lang="en-US" dirty="0">
-              <a:solidFill>
-                <a:schemeClr val="accent1"/>
-              </a:solidFill>
-            </a:endParaRPr>
-          </a:p>
-        </p:txBody>
-      </p:sp>
+              <a:t>https://pycom.io/wp-content/uploads/2017/08/wipySpecsheetAugust2017.pdf</a:t>
+            </a:r>
+            <a:endParaRPr lang="en-US"/>
+          </a:p>
+        </p:txBody>
+      </p:sp>
+      <p:pic>
+        <p:nvPicPr>
+          <p:cNvPr id="7" name="Picture 6"/>
+          <p:cNvPicPr>
+            <a:picLocks noChangeAspect="1"/>
+          </p:cNvPicPr>
+          <p:nvPr/>
+        </p:nvPicPr>
+        <p:blipFill>
+          <a:blip r:embed="rId3"/>
+          <a:stretch>
+            <a:fillRect/>
+          </a:stretch>
+        </p:blipFill>
+        <p:spPr>
+          <a:xfrm>
+            <a:off x="3307659" y="822180"/>
+            <a:ext cx="6692900" cy="4546600"/>
+          </a:xfrm>
+          <a:prstGeom prst="rect">
+            <a:avLst/>
+          </a:prstGeom>
+        </p:spPr>
+      </p:pic>
     </p:spTree>
     <p:extLst>
       <p:ext uri="{BB962C8B-B14F-4D97-AF65-F5344CB8AC3E}">
-        <p14:creationId xmlns:p14="http://schemas.microsoft.com/office/powerpoint/2010/main" val="3105801543"/>
+        <p14:creationId xmlns:p14="http://schemas.microsoft.com/office/powerpoint/2010/main" val="3230786051"/>
       </p:ext>
     </p:extLst>
   </p:cSld>
@@ -4502,6 +4583,780 @@
       </p:par>
     </p:tnLst>
   </p:timing>
+</p:sld>
+</file>
+
+<file path=ppt/slides/slide13.xml><?xml version="1.0" encoding="utf-8"?>
+<p:sld xmlns:a="http://schemas.openxmlformats.org/drawingml/2006/main" xmlns:r="http://schemas.openxmlformats.org/officeDocument/2006/relationships" xmlns:p="http://schemas.openxmlformats.org/presentationml/2006/main">
+  <p:cSld>
+    <p:spTree>
+      <p:nvGrpSpPr>
+        <p:cNvPr id="1" name=""/>
+        <p:cNvGrpSpPr/>
+        <p:nvPr/>
+      </p:nvGrpSpPr>
+      <p:grpSpPr>
+        <a:xfrm>
+          <a:off x="0" y="0"/>
+          <a:ext cx="0" cy="0"/>
+          <a:chOff x="0" y="0"/>
+          <a:chExt cx="0" cy="0"/>
+        </a:xfrm>
+      </p:grpSpPr>
+      <p:pic>
+        <p:nvPicPr>
+          <p:cNvPr id="10" name="Picture 9"/>
+          <p:cNvPicPr>
+            <a:picLocks noChangeAspect="1"/>
+          </p:cNvPicPr>
+          <p:nvPr/>
+        </p:nvPicPr>
+        <p:blipFill>
+          <a:blip r:embed="rId3"/>
+          <a:stretch>
+            <a:fillRect/>
+          </a:stretch>
+        </p:blipFill>
+        <p:spPr>
+          <a:xfrm>
+            <a:off x="6278884" y="968644"/>
+            <a:ext cx="5073595" cy="4983398"/>
+          </a:xfrm>
+          <a:prstGeom prst="rect">
+            <a:avLst/>
+          </a:prstGeom>
+        </p:spPr>
+      </p:pic>
+      <p:pic>
+        <p:nvPicPr>
+          <p:cNvPr id="9" name="Picture 8"/>
+          <p:cNvPicPr>
+            <a:picLocks noChangeAspect="1"/>
+          </p:cNvPicPr>
+          <p:nvPr/>
+        </p:nvPicPr>
+        <p:blipFill>
+          <a:blip r:embed="rId4"/>
+          <a:stretch>
+            <a:fillRect/>
+          </a:stretch>
+        </p:blipFill>
+        <p:spPr>
+          <a:xfrm>
+            <a:off x="261746" y="1156842"/>
+            <a:ext cx="5201676" cy="4423194"/>
+          </a:xfrm>
+          <a:prstGeom prst="rect">
+            <a:avLst/>
+          </a:prstGeom>
+        </p:spPr>
+      </p:pic>
+      <p:sp>
+        <p:nvSpPr>
+          <p:cNvPr id="12" name="TextBox 11"/>
+          <p:cNvSpPr txBox="1"/>
+          <p:nvPr/>
+        </p:nvSpPr>
+        <p:spPr>
+          <a:xfrm>
+            <a:off x="3799006" y="383875"/>
+            <a:ext cx="4539597" cy="553998"/>
+          </a:xfrm>
+          <a:prstGeom prst="rect">
+            <a:avLst/>
+          </a:prstGeom>
+          <a:noFill/>
+        </p:spPr>
+        <p:txBody>
+          <a:bodyPr wrap="square" rtlCol="0">
+            <a:spAutoFit/>
+          </a:bodyPr>
+          <a:lstStyle/>
+          <a:p>
+            <a:r>
+              <a:rPr lang="en-US" sz="3000" b="1" dirty="0">
+                <a:solidFill>
+                  <a:schemeClr val="accent1"/>
+                </a:solidFill>
+                <a:latin typeface="Cambria" panose="02040503050406030204" pitchFamily="18" charset="0"/>
+              </a:rPr>
+              <a:t>EXPANSION BOARDS</a:t>
+            </a:r>
+          </a:p>
+        </p:txBody>
+      </p:sp>
+    </p:spTree>
+    <p:extLst>
+      <p:ext uri="{BB962C8B-B14F-4D97-AF65-F5344CB8AC3E}">
+        <p14:creationId xmlns:p14="http://schemas.microsoft.com/office/powerpoint/2010/main" val="3246652878"/>
+      </p:ext>
+    </p:extLst>
+  </p:cSld>
+  <p:clrMapOvr>
+    <a:masterClrMapping/>
+  </p:clrMapOvr>
+  <mc:AlternateContent xmlns:mc="http://schemas.openxmlformats.org/markup-compatibility/2006" xmlns:p14="http://schemas.microsoft.com/office/powerpoint/2010/main">
+    <mc:Choice Requires="p14">
+      <p:transition spd="med" p14:dur="700">
+        <p:fade/>
+      </p:transition>
+    </mc:Choice>
+    <mc:Fallback xmlns="">
+      <p:transition spd="med">
+        <p:fade/>
+      </p:transition>
+    </mc:Fallback>
+  </mc:AlternateContent>
+  <p:timing>
+    <p:tnLst>
+      <p:par>
+        <p:cTn xmlns:p14="http://schemas.microsoft.com/office/powerpoint/2010/main" id="1" dur="indefinite" restart="never" nodeType="tmRoot"/>
+      </p:par>
+    </p:tnLst>
+  </p:timing>
+</p:sld>
+</file>
+
+<file path=ppt/slides/slide14.xml><?xml version="1.0" encoding="utf-8"?>
+<p:sld xmlns:a="http://schemas.openxmlformats.org/drawingml/2006/main" xmlns:r="http://schemas.openxmlformats.org/officeDocument/2006/relationships" xmlns:p="http://schemas.openxmlformats.org/presentationml/2006/main">
+  <p:cSld>
+    <p:spTree>
+      <p:nvGrpSpPr>
+        <p:cNvPr id="1" name=""/>
+        <p:cNvGrpSpPr/>
+        <p:nvPr/>
+      </p:nvGrpSpPr>
+      <p:grpSpPr>
+        <a:xfrm>
+          <a:off x="0" y="0"/>
+          <a:ext cx="0" cy="0"/>
+          <a:chOff x="0" y="0"/>
+          <a:chExt cx="0" cy="0"/>
+        </a:xfrm>
+      </p:grpSpPr>
+      <p:sp>
+        <p:nvSpPr>
+          <p:cNvPr id="4" name="TextBox 3"/>
+          <p:cNvSpPr txBox="1"/>
+          <p:nvPr/>
+        </p:nvSpPr>
+        <p:spPr>
+          <a:xfrm>
+            <a:off x="3170405" y="2359337"/>
+            <a:ext cx="5630029" cy="707886"/>
+          </a:xfrm>
+          <a:prstGeom prst="rect">
+            <a:avLst/>
+          </a:prstGeom>
+          <a:noFill/>
+        </p:spPr>
+        <p:txBody>
+          <a:bodyPr wrap="square" rtlCol="0">
+            <a:spAutoFit/>
+          </a:bodyPr>
+          <a:lstStyle/>
+          <a:p>
+            <a:r>
+              <a:rPr lang="en-US" sz="4000" b="1" dirty="0">
+                <a:solidFill>
+                  <a:schemeClr val="accent1"/>
+                </a:solidFill>
+                <a:latin typeface="Cambria" panose="02040503050406030204" pitchFamily="18" charset="0"/>
+              </a:rPr>
+              <a:t>TYPICAL WORKFLOW</a:t>
+            </a:r>
+          </a:p>
+        </p:txBody>
+      </p:sp>
+    </p:spTree>
+    <p:extLst>
+      <p:ext uri="{BB962C8B-B14F-4D97-AF65-F5344CB8AC3E}">
+        <p14:creationId xmlns:p14="http://schemas.microsoft.com/office/powerpoint/2010/main" val="157723696"/>
+      </p:ext>
+    </p:extLst>
+  </p:cSld>
+  <p:clrMapOvr>
+    <a:masterClrMapping/>
+  </p:clrMapOvr>
+  <mc:AlternateContent xmlns:mc="http://schemas.openxmlformats.org/markup-compatibility/2006" xmlns:p14="http://schemas.microsoft.com/office/powerpoint/2010/main">
+    <mc:Choice Requires="p14">
+      <p:transition spd="med" p14:dur="700">
+        <p:fade/>
+      </p:transition>
+    </mc:Choice>
+    <mc:Fallback xmlns="">
+      <p:transition spd="med">
+        <p:fade/>
+      </p:transition>
+    </mc:Fallback>
+  </mc:AlternateContent>
+  <p:timing>
+    <p:tnLst>
+      <p:par>
+        <p:cTn xmlns:p14="http://schemas.microsoft.com/office/powerpoint/2010/main" id="1" dur="indefinite" restart="never" nodeType="tmRoot"/>
+      </p:par>
+    </p:tnLst>
+  </p:timing>
+</p:sld>
+</file>
+
+<file path=ppt/slides/slide15.xml><?xml version="1.0" encoding="utf-8"?>
+<p:sld xmlns:a="http://schemas.openxmlformats.org/drawingml/2006/main" xmlns:r="http://schemas.openxmlformats.org/officeDocument/2006/relationships" xmlns:p="http://schemas.openxmlformats.org/presentationml/2006/main">
+  <p:cSld>
+    <p:spTree>
+      <p:nvGrpSpPr>
+        <p:cNvPr id="1" name=""/>
+        <p:cNvGrpSpPr/>
+        <p:nvPr/>
+      </p:nvGrpSpPr>
+      <p:grpSpPr>
+        <a:xfrm>
+          <a:off x="0" y="0"/>
+          <a:ext cx="0" cy="0"/>
+          <a:chOff x="0" y="0"/>
+          <a:chExt cx="0" cy="0"/>
+        </a:xfrm>
+      </p:grpSpPr>
+      <p:pic>
+        <p:nvPicPr>
+          <p:cNvPr id="5" name="Picture 4"/>
+          <p:cNvPicPr>
+            <a:picLocks noChangeAspect="1"/>
+          </p:cNvPicPr>
+          <p:nvPr/>
+        </p:nvPicPr>
+        <p:blipFill>
+          <a:blip r:embed="rId2"/>
+          <a:stretch>
+            <a:fillRect/>
+          </a:stretch>
+        </p:blipFill>
+        <p:spPr>
+          <a:xfrm>
+            <a:off x="1731860" y="1269865"/>
+            <a:ext cx="7450846" cy="5588135"/>
+          </a:xfrm>
+          <a:prstGeom prst="rect">
+            <a:avLst/>
+          </a:prstGeom>
+        </p:spPr>
+      </p:pic>
+      <p:sp>
+        <p:nvSpPr>
+          <p:cNvPr id="6" name="TextBox 5"/>
+          <p:cNvSpPr txBox="1"/>
+          <p:nvPr/>
+        </p:nvSpPr>
+        <p:spPr>
+          <a:xfrm>
+            <a:off x="1951686" y="435184"/>
+            <a:ext cx="7220778" cy="553998"/>
+          </a:xfrm>
+          <a:prstGeom prst="rect">
+            <a:avLst/>
+          </a:prstGeom>
+          <a:noFill/>
+        </p:spPr>
+        <p:txBody>
+          <a:bodyPr wrap="square" rtlCol="0">
+            <a:spAutoFit/>
+          </a:bodyPr>
+          <a:lstStyle/>
+          <a:p>
+            <a:r>
+              <a:rPr lang="en-US" sz="3000" b="1" dirty="0">
+                <a:solidFill>
+                  <a:schemeClr val="accent1"/>
+                </a:solidFill>
+                <a:latin typeface="Cambria" panose="02040503050406030204" pitchFamily="18" charset="0"/>
+              </a:rPr>
+              <a:t>1. INSTALL ATOM IDE</a:t>
+            </a:r>
+          </a:p>
+        </p:txBody>
+      </p:sp>
+    </p:spTree>
+    <p:extLst>
+      <p:ext uri="{BB962C8B-B14F-4D97-AF65-F5344CB8AC3E}">
+        <p14:creationId xmlns:p14="http://schemas.microsoft.com/office/powerpoint/2010/main" val="1255224638"/>
+      </p:ext>
+    </p:extLst>
+  </p:cSld>
+  <p:clrMapOvr>
+    <a:masterClrMapping/>
+  </p:clrMapOvr>
+  <p:timing>
+    <p:tnLst>
+      <p:par>
+        <p:cTn xmlns:p14="http://schemas.microsoft.com/office/powerpoint/2010/main" id="1" dur="indefinite" restart="never" nodeType="tmRoot"/>
+      </p:par>
+    </p:tnLst>
+  </p:timing>
+</p:sld>
+</file>
+
+<file path=ppt/slides/slide16.xml><?xml version="1.0" encoding="utf-8"?>
+<p:sld xmlns:a="http://schemas.openxmlformats.org/drawingml/2006/main" xmlns:r="http://schemas.openxmlformats.org/officeDocument/2006/relationships" xmlns:p="http://schemas.openxmlformats.org/presentationml/2006/main">
+  <p:cSld>
+    <p:spTree>
+      <p:nvGrpSpPr>
+        <p:cNvPr id="1" name=""/>
+        <p:cNvGrpSpPr/>
+        <p:nvPr/>
+      </p:nvGrpSpPr>
+      <p:grpSpPr>
+        <a:xfrm>
+          <a:off x="0" y="0"/>
+          <a:ext cx="0" cy="0"/>
+          <a:chOff x="0" y="0"/>
+          <a:chExt cx="0" cy="0"/>
+        </a:xfrm>
+      </p:grpSpPr>
+      <p:pic>
+        <p:nvPicPr>
+          <p:cNvPr id="5" name="Picture 4"/>
+          <p:cNvPicPr>
+            <a:picLocks noChangeAspect="1"/>
+          </p:cNvPicPr>
+          <p:nvPr/>
+        </p:nvPicPr>
+        <p:blipFill>
+          <a:blip r:embed="rId2"/>
+          <a:stretch>
+            <a:fillRect/>
+          </a:stretch>
+        </p:blipFill>
+        <p:spPr>
+          <a:xfrm>
+            <a:off x="1783179" y="1028875"/>
+            <a:ext cx="9278650" cy="4199184"/>
+          </a:xfrm>
+          <a:prstGeom prst="rect">
+            <a:avLst/>
+          </a:prstGeom>
+        </p:spPr>
+      </p:pic>
+      <p:sp>
+        <p:nvSpPr>
+          <p:cNvPr id="7" name="TextBox 6"/>
+          <p:cNvSpPr txBox="1"/>
+          <p:nvPr/>
+        </p:nvSpPr>
+        <p:spPr>
+          <a:xfrm>
+            <a:off x="1951686" y="435184"/>
+            <a:ext cx="7220778" cy="553998"/>
+          </a:xfrm>
+          <a:prstGeom prst="rect">
+            <a:avLst/>
+          </a:prstGeom>
+          <a:noFill/>
+        </p:spPr>
+        <p:txBody>
+          <a:bodyPr wrap="square" rtlCol="0">
+            <a:spAutoFit/>
+          </a:bodyPr>
+          <a:lstStyle/>
+          <a:p>
+            <a:r>
+              <a:rPr lang="en-US" sz="3000" b="1" dirty="0">
+                <a:solidFill>
+                  <a:schemeClr val="accent1"/>
+                </a:solidFill>
+                <a:latin typeface="Cambria" panose="02040503050406030204" pitchFamily="18" charset="0"/>
+              </a:rPr>
+              <a:t>2</a:t>
+            </a:r>
+            <a:r>
+              <a:rPr lang="en-US" sz="3000" b="1" dirty="0">
+                <a:solidFill>
+                  <a:schemeClr val="accent1"/>
+                </a:solidFill>
+                <a:latin typeface="Cambria" panose="02040503050406030204" pitchFamily="18" charset="0"/>
+              </a:rPr>
+              <a:t>. INSTALL “PYMAKR” PLUGIN</a:t>
+            </a:r>
+          </a:p>
+        </p:txBody>
+      </p:sp>
+    </p:spTree>
+    <p:extLst>
+      <p:ext uri="{BB962C8B-B14F-4D97-AF65-F5344CB8AC3E}">
+        <p14:creationId xmlns:p14="http://schemas.microsoft.com/office/powerpoint/2010/main" val="3058949498"/>
+      </p:ext>
+    </p:extLst>
+  </p:cSld>
+  <p:clrMapOvr>
+    <a:masterClrMapping/>
+  </p:clrMapOvr>
+  <p:timing>
+    <p:tnLst>
+      <p:par>
+        <p:cTn xmlns:p14="http://schemas.microsoft.com/office/powerpoint/2010/main" id="1" dur="indefinite" restart="never" nodeType="tmRoot"/>
+      </p:par>
+    </p:tnLst>
+  </p:timing>
+</p:sld>
+</file>
+
+<file path=ppt/slides/slide17.xml><?xml version="1.0" encoding="utf-8"?>
+<p:sld xmlns:a="http://schemas.openxmlformats.org/drawingml/2006/main" xmlns:r="http://schemas.openxmlformats.org/officeDocument/2006/relationships" xmlns:p="http://schemas.openxmlformats.org/presentationml/2006/main">
+  <p:cSld>
+    <p:spTree>
+      <p:nvGrpSpPr>
+        <p:cNvPr id="1" name=""/>
+        <p:cNvGrpSpPr/>
+        <p:nvPr/>
+      </p:nvGrpSpPr>
+      <p:grpSpPr>
+        <a:xfrm>
+          <a:off x="0" y="0"/>
+          <a:ext cx="0" cy="0"/>
+          <a:chOff x="0" y="0"/>
+          <a:chExt cx="0" cy="0"/>
+        </a:xfrm>
+      </p:grpSpPr>
+      <p:pic>
+        <p:nvPicPr>
+          <p:cNvPr id="2" name="Picture 1"/>
+          <p:cNvPicPr>
+            <a:picLocks noChangeAspect="1"/>
+          </p:cNvPicPr>
+          <p:nvPr/>
+        </p:nvPicPr>
+        <p:blipFill>
+          <a:blip r:embed="rId2"/>
+          <a:stretch>
+            <a:fillRect/>
+          </a:stretch>
+        </p:blipFill>
+        <p:spPr>
+          <a:xfrm>
+            <a:off x="1962778" y="1197838"/>
+            <a:ext cx="6674485" cy="5023588"/>
+          </a:xfrm>
+          <a:prstGeom prst="rect">
+            <a:avLst/>
+          </a:prstGeom>
+        </p:spPr>
+      </p:pic>
+      <p:sp>
+        <p:nvSpPr>
+          <p:cNvPr id="4" name="TextBox 3"/>
+          <p:cNvSpPr txBox="1"/>
+          <p:nvPr/>
+        </p:nvSpPr>
+        <p:spPr>
+          <a:xfrm>
+            <a:off x="1951686" y="435184"/>
+            <a:ext cx="7220778" cy="553998"/>
+          </a:xfrm>
+          <a:prstGeom prst="rect">
+            <a:avLst/>
+          </a:prstGeom>
+          <a:noFill/>
+        </p:spPr>
+        <p:txBody>
+          <a:bodyPr wrap="square" rtlCol="0">
+            <a:spAutoFit/>
+          </a:bodyPr>
+          <a:lstStyle/>
+          <a:p>
+            <a:r>
+              <a:rPr lang="en-US" sz="3000" b="1" dirty="0">
+                <a:solidFill>
+                  <a:schemeClr val="accent1"/>
+                </a:solidFill>
+                <a:latin typeface="Cambria" panose="02040503050406030204" pitchFamily="18" charset="0"/>
+              </a:rPr>
+              <a:t>3. CONNECTION VIA USB</a:t>
+            </a:r>
+          </a:p>
+        </p:txBody>
+      </p:sp>
+    </p:spTree>
+    <p:extLst>
+      <p:ext uri="{BB962C8B-B14F-4D97-AF65-F5344CB8AC3E}">
+        <p14:creationId xmlns:p14="http://schemas.microsoft.com/office/powerpoint/2010/main" val="784855200"/>
+      </p:ext>
+    </p:extLst>
+  </p:cSld>
+  <p:clrMapOvr>
+    <a:masterClrMapping/>
+  </p:clrMapOvr>
+</p:sld>
+</file>
+
+<file path=ppt/slides/slide18.xml><?xml version="1.0" encoding="utf-8"?>
+<p:sld xmlns:a="http://schemas.openxmlformats.org/drawingml/2006/main" xmlns:r="http://schemas.openxmlformats.org/officeDocument/2006/relationships" xmlns:p="http://schemas.openxmlformats.org/presentationml/2006/main">
+  <p:cSld>
+    <p:spTree>
+      <p:nvGrpSpPr>
+        <p:cNvPr id="1" name=""/>
+        <p:cNvGrpSpPr/>
+        <p:nvPr/>
+      </p:nvGrpSpPr>
+      <p:grpSpPr>
+        <a:xfrm>
+          <a:off x="0" y="0"/>
+          <a:ext cx="0" cy="0"/>
+          <a:chOff x="0" y="0"/>
+          <a:chExt cx="0" cy="0"/>
+        </a:xfrm>
+      </p:grpSpPr>
+      <p:sp>
+        <p:nvSpPr>
+          <p:cNvPr id="4" name="TextBox 3"/>
+          <p:cNvSpPr txBox="1"/>
+          <p:nvPr/>
+        </p:nvSpPr>
+        <p:spPr>
+          <a:xfrm>
+            <a:off x="1951686" y="435184"/>
+            <a:ext cx="7220778" cy="553998"/>
+          </a:xfrm>
+          <a:prstGeom prst="rect">
+            <a:avLst/>
+          </a:prstGeom>
+          <a:noFill/>
+        </p:spPr>
+        <p:txBody>
+          <a:bodyPr wrap="square" rtlCol="0">
+            <a:spAutoFit/>
+          </a:bodyPr>
+          <a:lstStyle/>
+          <a:p>
+            <a:r>
+              <a:rPr lang="en-US" sz="3000" b="1" dirty="0">
+                <a:solidFill>
+                  <a:schemeClr val="accent1"/>
+                </a:solidFill>
+                <a:latin typeface="Cambria" panose="02040503050406030204" pitchFamily="18" charset="0"/>
+              </a:rPr>
+              <a:t>4</a:t>
+            </a:r>
+            <a:r>
+              <a:rPr lang="en-US" sz="3000" b="1" dirty="0">
+                <a:solidFill>
+                  <a:schemeClr val="accent1"/>
+                </a:solidFill>
+                <a:latin typeface="Cambria" panose="02040503050406030204" pitchFamily="18" charset="0"/>
+              </a:rPr>
+              <a:t>. GET ID OF YOUR SERIAL PORT</a:t>
+            </a:r>
+          </a:p>
+        </p:txBody>
+      </p:sp>
+      <p:pic>
+        <p:nvPicPr>
+          <p:cNvPr id="5" name="Picture 4"/>
+          <p:cNvPicPr>
+            <a:picLocks noChangeAspect="1"/>
+          </p:cNvPicPr>
+          <p:nvPr/>
+        </p:nvPicPr>
+        <p:blipFill>
+          <a:blip r:embed="rId2"/>
+          <a:stretch>
+            <a:fillRect/>
+          </a:stretch>
+        </p:blipFill>
+        <p:spPr>
+          <a:xfrm>
+            <a:off x="2065408" y="1544628"/>
+            <a:ext cx="6341992" cy="3475064"/>
+          </a:xfrm>
+          <a:prstGeom prst="rect">
+            <a:avLst/>
+          </a:prstGeom>
+        </p:spPr>
+      </p:pic>
+      <p:sp>
+        <p:nvSpPr>
+          <p:cNvPr id="6" name="Oval 5"/>
+          <p:cNvSpPr/>
+          <p:nvPr/>
+        </p:nvSpPr>
+        <p:spPr>
+          <a:xfrm>
+            <a:off x="3604600" y="2022030"/>
+            <a:ext cx="1847322" cy="623932"/>
+          </a:xfrm>
+          <a:prstGeom prst="ellipse">
+            <a:avLst/>
+          </a:prstGeom>
+          <a:noFill/>
+          <a:ln w="38100" cmpd="sng">
+            <a:solidFill>
+              <a:srgbClr val="FF0000"/>
+            </a:solidFill>
+          </a:ln>
+        </p:spPr>
+        <p:style>
+          <a:lnRef idx="1">
+            <a:schemeClr val="accent1"/>
+          </a:lnRef>
+          <a:fillRef idx="3">
+            <a:schemeClr val="accent1"/>
+          </a:fillRef>
+          <a:effectRef idx="2">
+            <a:schemeClr val="accent1"/>
+          </a:effectRef>
+          <a:fontRef idx="minor">
+            <a:schemeClr val="lt1"/>
+          </a:fontRef>
+        </p:style>
+        <p:txBody>
+          <a:bodyPr rtlCol="0" anchor="ctr"/>
+          <a:lstStyle/>
+          <a:p>
+            <a:pPr algn="ctr"/>
+            <a:endParaRPr lang="en-US"/>
+          </a:p>
+        </p:txBody>
+      </p:sp>
+    </p:spTree>
+    <p:extLst>
+      <p:ext uri="{BB962C8B-B14F-4D97-AF65-F5344CB8AC3E}">
+        <p14:creationId xmlns:p14="http://schemas.microsoft.com/office/powerpoint/2010/main" val="558083334"/>
+      </p:ext>
+    </p:extLst>
+  </p:cSld>
+  <p:clrMapOvr>
+    <a:masterClrMapping/>
+  </p:clrMapOvr>
+</p:sld>
+</file>
+
+<file path=ppt/slides/slide19.xml><?xml version="1.0" encoding="utf-8"?>
+<p:sld xmlns:a="http://schemas.openxmlformats.org/drawingml/2006/main" xmlns:r="http://schemas.openxmlformats.org/officeDocument/2006/relationships" xmlns:p="http://schemas.openxmlformats.org/presentationml/2006/main">
+  <p:cSld>
+    <p:spTree>
+      <p:nvGrpSpPr>
+        <p:cNvPr id="1" name=""/>
+        <p:cNvGrpSpPr/>
+        <p:nvPr/>
+      </p:nvGrpSpPr>
+      <p:grpSpPr>
+        <a:xfrm>
+          <a:off x="0" y="0"/>
+          <a:ext cx="0" cy="0"/>
+          <a:chOff x="0" y="0"/>
+          <a:chExt cx="0" cy="0"/>
+        </a:xfrm>
+      </p:grpSpPr>
+      <p:sp>
+        <p:nvSpPr>
+          <p:cNvPr id="4" name="TextBox 3"/>
+          <p:cNvSpPr txBox="1"/>
+          <p:nvPr/>
+        </p:nvSpPr>
+        <p:spPr>
+          <a:xfrm>
+            <a:off x="1951685" y="435184"/>
+            <a:ext cx="9324671" cy="553998"/>
+          </a:xfrm>
+          <a:prstGeom prst="rect">
+            <a:avLst/>
+          </a:prstGeom>
+          <a:noFill/>
+        </p:spPr>
+        <p:txBody>
+          <a:bodyPr wrap="square" rtlCol="0">
+            <a:spAutoFit/>
+          </a:bodyPr>
+          <a:lstStyle/>
+          <a:p>
+            <a:r>
+              <a:rPr lang="en-US" sz="3000" b="1" dirty="0">
+                <a:solidFill>
+                  <a:schemeClr val="accent1"/>
+                </a:solidFill>
+                <a:latin typeface="Cambria" panose="02040503050406030204" pitchFamily="18" charset="0"/>
+              </a:rPr>
+              <a:t>4. ACCESS GLOBAL SETTINGS</a:t>
+            </a:r>
+          </a:p>
+        </p:txBody>
+      </p:sp>
+      <p:pic>
+        <p:nvPicPr>
+          <p:cNvPr id="5" name="Picture 4"/>
+          <p:cNvPicPr>
+            <a:picLocks noChangeAspect="1"/>
+          </p:cNvPicPr>
+          <p:nvPr/>
+        </p:nvPicPr>
+        <p:blipFill>
+          <a:blip r:embed="rId2"/>
+          <a:stretch>
+            <a:fillRect/>
+          </a:stretch>
+        </p:blipFill>
+        <p:spPr>
+          <a:xfrm>
+            <a:off x="2052579" y="1593035"/>
+            <a:ext cx="5437205" cy="3262323"/>
+          </a:xfrm>
+          <a:prstGeom prst="rect">
+            <a:avLst/>
+          </a:prstGeom>
+        </p:spPr>
+      </p:pic>
+      <p:sp>
+        <p:nvSpPr>
+          <p:cNvPr id="6" name="Oval 5"/>
+          <p:cNvSpPr/>
+          <p:nvPr/>
+        </p:nvSpPr>
+        <p:spPr>
+          <a:xfrm>
+            <a:off x="4746347" y="3091471"/>
+            <a:ext cx="2232422" cy="542221"/>
+          </a:xfrm>
+          <a:prstGeom prst="ellipse">
+            <a:avLst/>
+          </a:prstGeom>
+          <a:noFill/>
+          <a:ln w="38100" cmpd="sng">
+            <a:solidFill>
+              <a:srgbClr val="FF0000"/>
+            </a:solidFill>
+          </a:ln>
+        </p:spPr>
+        <p:style>
+          <a:lnRef idx="1">
+            <a:schemeClr val="accent1"/>
+          </a:lnRef>
+          <a:fillRef idx="3">
+            <a:schemeClr val="accent1"/>
+          </a:fillRef>
+          <a:effectRef idx="2">
+            <a:schemeClr val="accent1"/>
+          </a:effectRef>
+          <a:fontRef idx="minor">
+            <a:schemeClr val="lt1"/>
+          </a:fontRef>
+        </p:style>
+        <p:txBody>
+          <a:bodyPr rtlCol="0" anchor="ctr"/>
+          <a:lstStyle/>
+          <a:p>
+            <a:pPr algn="ctr"/>
+            <a:endParaRPr lang="en-US"/>
+          </a:p>
+        </p:txBody>
+      </p:sp>
+    </p:spTree>
+    <p:extLst>
+      <p:ext uri="{BB962C8B-B14F-4D97-AF65-F5344CB8AC3E}">
+        <p14:creationId xmlns:p14="http://schemas.microsoft.com/office/powerpoint/2010/main" val="3558217022"/>
+      </p:ext>
+    </p:extLst>
+  </p:cSld>
+  <p:clrMapOvr>
+    <a:masterClrMapping/>
+  </p:clrMapOvr>
 </p:sld>
 </file>
 
@@ -4564,7 +5419,7 @@
         </p:nvSpPr>
         <p:spPr>
           <a:xfrm>
-            <a:off x="1263001" y="2061780"/>
+            <a:off x="1263001" y="1766736"/>
             <a:ext cx="9909364" cy="400110"/>
           </a:xfrm>
           <a:prstGeom prst="rect">
@@ -4602,7 +5457,7 @@
         </p:nvSpPr>
         <p:spPr>
           <a:xfrm>
-            <a:off x="1263001" y="2620900"/>
+            <a:off x="1263001" y="2325856"/>
             <a:ext cx="9909364" cy="400110"/>
           </a:xfrm>
           <a:prstGeom prst="rect">
@@ -4640,7 +5495,7 @@
         </p:nvSpPr>
         <p:spPr>
           <a:xfrm>
-            <a:off x="1263001" y="4298260"/>
+            <a:off x="1263001" y="4003216"/>
             <a:ext cx="9909364" cy="400110"/>
           </a:xfrm>
           <a:prstGeom prst="rect">
@@ -4678,7 +5533,7 @@
         </p:nvSpPr>
         <p:spPr>
           <a:xfrm>
-            <a:off x="1263001" y="3739140"/>
+            <a:off x="1263001" y="3444096"/>
             <a:ext cx="9909364" cy="400110"/>
           </a:xfrm>
           <a:prstGeom prst="rect">
@@ -4725,7 +5580,7 @@
         </p:nvSpPr>
         <p:spPr>
           <a:xfrm>
-            <a:off x="1263001" y="3180020"/>
+            <a:off x="1263001" y="2884976"/>
             <a:ext cx="9909364" cy="400110"/>
           </a:xfrm>
           <a:prstGeom prst="rect">
@@ -4763,7 +5618,7 @@
         </p:nvSpPr>
         <p:spPr>
           <a:xfrm>
-            <a:off x="1263001" y="4857380"/>
+            <a:off x="1263001" y="4562336"/>
             <a:ext cx="9909364" cy="400110"/>
           </a:xfrm>
           <a:prstGeom prst="rect">
@@ -4801,7 +5656,7 @@
         </p:nvSpPr>
         <p:spPr>
           <a:xfrm>
-            <a:off x="1263001" y="5416501"/>
+            <a:off x="1263001" y="5121457"/>
             <a:ext cx="9909364" cy="400110"/>
           </a:xfrm>
           <a:prstGeom prst="rect">
@@ -4853,6 +5708,807 @@
       </p:transition>
     </mc:Fallback>
   </mc:AlternateContent>
+  <p:timing>
+    <p:tnLst>
+      <p:par>
+        <p:cTn xmlns:p14="http://schemas.microsoft.com/office/powerpoint/2010/main" id="1" dur="indefinite" restart="never" nodeType="tmRoot"/>
+      </p:par>
+    </p:tnLst>
+  </p:timing>
+</p:sld>
+</file>
+
+<file path=ppt/slides/slide20.xml><?xml version="1.0" encoding="utf-8"?>
+<p:sld xmlns:a="http://schemas.openxmlformats.org/drawingml/2006/main" xmlns:r="http://schemas.openxmlformats.org/officeDocument/2006/relationships" xmlns:p="http://schemas.openxmlformats.org/presentationml/2006/main">
+  <p:cSld>
+    <p:spTree>
+      <p:nvGrpSpPr>
+        <p:cNvPr id="1" name=""/>
+        <p:cNvGrpSpPr/>
+        <p:nvPr/>
+      </p:nvGrpSpPr>
+      <p:grpSpPr>
+        <a:xfrm>
+          <a:off x="0" y="0"/>
+          <a:ext cx="0" cy="0"/>
+          <a:chOff x="0" y="0"/>
+          <a:chExt cx="0" cy="0"/>
+        </a:xfrm>
+      </p:grpSpPr>
+      <p:sp>
+        <p:nvSpPr>
+          <p:cNvPr id="4" name="TextBox 3"/>
+          <p:cNvSpPr txBox="1"/>
+          <p:nvPr/>
+        </p:nvSpPr>
+        <p:spPr>
+          <a:xfrm>
+            <a:off x="1951685" y="435184"/>
+            <a:ext cx="9324671" cy="553998"/>
+          </a:xfrm>
+          <a:prstGeom prst="rect">
+            <a:avLst/>
+          </a:prstGeom>
+          <a:noFill/>
+        </p:spPr>
+        <p:txBody>
+          <a:bodyPr wrap="square" rtlCol="0">
+            <a:spAutoFit/>
+          </a:bodyPr>
+          <a:lstStyle/>
+          <a:p>
+            <a:r>
+              <a:rPr lang="en-US" sz="3000" b="1" dirty="0">
+                <a:solidFill>
+                  <a:schemeClr val="accent1"/>
+                </a:solidFill>
+                <a:latin typeface="Cambria" panose="02040503050406030204" pitchFamily="18" charset="0"/>
+              </a:rPr>
+              <a:t>5</a:t>
+            </a:r>
+            <a:r>
+              <a:rPr lang="en-US" sz="3000" b="1" dirty="0">
+                <a:solidFill>
+                  <a:schemeClr val="accent1"/>
+                </a:solidFill>
+                <a:latin typeface="Cambria" panose="02040503050406030204" pitchFamily="18" charset="0"/>
+              </a:rPr>
+              <a:t>. UPDATE GLOBAL SETTINGS</a:t>
+            </a:r>
+          </a:p>
+        </p:txBody>
+      </p:sp>
+      <p:pic>
+        <p:nvPicPr>
+          <p:cNvPr id="2" name="Picture 1"/>
+          <p:cNvPicPr>
+            <a:picLocks noChangeAspect="1"/>
+          </p:cNvPicPr>
+          <p:nvPr/>
+        </p:nvPicPr>
+        <p:blipFill>
+          <a:blip r:embed="rId2"/>
+          <a:stretch>
+            <a:fillRect/>
+          </a:stretch>
+        </p:blipFill>
+        <p:spPr>
+          <a:xfrm>
+            <a:off x="1946065" y="977772"/>
+            <a:ext cx="8073088" cy="4428665"/>
+          </a:xfrm>
+          <a:prstGeom prst="rect">
+            <a:avLst/>
+          </a:prstGeom>
+        </p:spPr>
+      </p:pic>
+    </p:spTree>
+    <p:extLst>
+      <p:ext uri="{BB962C8B-B14F-4D97-AF65-F5344CB8AC3E}">
+        <p14:creationId xmlns:p14="http://schemas.microsoft.com/office/powerpoint/2010/main" val="3067517374"/>
+      </p:ext>
+    </p:extLst>
+  </p:cSld>
+  <p:clrMapOvr>
+    <a:masterClrMapping/>
+  </p:clrMapOvr>
+</p:sld>
+</file>
+
+<file path=ppt/slides/slide21.xml><?xml version="1.0" encoding="utf-8"?>
+<p:sld xmlns:a="http://schemas.openxmlformats.org/drawingml/2006/main" xmlns:r="http://schemas.openxmlformats.org/officeDocument/2006/relationships" xmlns:p="http://schemas.openxmlformats.org/presentationml/2006/main">
+  <p:cSld>
+    <p:spTree>
+      <p:nvGrpSpPr>
+        <p:cNvPr id="1" name=""/>
+        <p:cNvGrpSpPr/>
+        <p:nvPr/>
+      </p:nvGrpSpPr>
+      <p:grpSpPr>
+        <a:xfrm>
+          <a:off x="0" y="0"/>
+          <a:ext cx="0" cy="0"/>
+          <a:chOff x="0" y="0"/>
+          <a:chExt cx="0" cy="0"/>
+        </a:xfrm>
+      </p:grpSpPr>
+      <p:sp>
+        <p:nvSpPr>
+          <p:cNvPr id="4" name="TextBox 3"/>
+          <p:cNvSpPr txBox="1"/>
+          <p:nvPr/>
+        </p:nvSpPr>
+        <p:spPr>
+          <a:xfrm>
+            <a:off x="1951685" y="435184"/>
+            <a:ext cx="9324671" cy="553998"/>
+          </a:xfrm>
+          <a:prstGeom prst="rect">
+            <a:avLst/>
+          </a:prstGeom>
+          <a:noFill/>
+        </p:spPr>
+        <p:txBody>
+          <a:bodyPr wrap="square" rtlCol="0">
+            <a:spAutoFit/>
+          </a:bodyPr>
+          <a:lstStyle/>
+          <a:p>
+            <a:r>
+              <a:rPr lang="en-US" sz="3000" b="1" dirty="0">
+                <a:solidFill>
+                  <a:schemeClr val="accent1"/>
+                </a:solidFill>
+                <a:latin typeface="Cambria" panose="02040503050406030204" pitchFamily="18" charset="0"/>
+              </a:rPr>
+              <a:t>6. CONNECT</a:t>
+            </a:r>
+          </a:p>
+        </p:txBody>
+      </p:sp>
+      <p:pic>
+        <p:nvPicPr>
+          <p:cNvPr id="3" name="Picture 2"/>
+          <p:cNvPicPr>
+            <a:picLocks noChangeAspect="1"/>
+          </p:cNvPicPr>
+          <p:nvPr/>
+        </p:nvPicPr>
+        <p:blipFill>
+          <a:blip r:embed="rId2"/>
+          <a:stretch>
+            <a:fillRect/>
+          </a:stretch>
+        </p:blipFill>
+        <p:spPr>
+          <a:xfrm>
+            <a:off x="1862013" y="1136360"/>
+            <a:ext cx="7480300" cy="3251200"/>
+          </a:xfrm>
+          <a:prstGeom prst="rect">
+            <a:avLst/>
+          </a:prstGeom>
+        </p:spPr>
+      </p:pic>
+    </p:spTree>
+    <p:extLst>
+      <p:ext uri="{BB962C8B-B14F-4D97-AF65-F5344CB8AC3E}">
+        <p14:creationId xmlns:p14="http://schemas.microsoft.com/office/powerpoint/2010/main" val="2766921727"/>
+      </p:ext>
+    </p:extLst>
+  </p:cSld>
+  <p:clrMapOvr>
+    <a:masterClrMapping/>
+  </p:clrMapOvr>
+</p:sld>
+</file>
+
+<file path=ppt/slides/slide22.xml><?xml version="1.0" encoding="utf-8"?>
+<p:sld xmlns:a="http://schemas.openxmlformats.org/drawingml/2006/main" xmlns:r="http://schemas.openxmlformats.org/officeDocument/2006/relationships" xmlns:p="http://schemas.openxmlformats.org/presentationml/2006/main">
+  <p:cSld>
+    <p:spTree>
+      <p:nvGrpSpPr>
+        <p:cNvPr id="1" name=""/>
+        <p:cNvGrpSpPr/>
+        <p:nvPr/>
+      </p:nvGrpSpPr>
+      <p:grpSpPr>
+        <a:xfrm>
+          <a:off x="0" y="0"/>
+          <a:ext cx="0" cy="0"/>
+          <a:chOff x="0" y="0"/>
+          <a:chExt cx="0" cy="0"/>
+        </a:xfrm>
+      </p:grpSpPr>
+      <p:sp>
+        <p:nvSpPr>
+          <p:cNvPr id="4" name="TextBox 3"/>
+          <p:cNvSpPr txBox="1"/>
+          <p:nvPr/>
+        </p:nvSpPr>
+        <p:spPr>
+          <a:xfrm>
+            <a:off x="1951685" y="435184"/>
+            <a:ext cx="9324671" cy="553998"/>
+          </a:xfrm>
+          <a:prstGeom prst="rect">
+            <a:avLst/>
+          </a:prstGeom>
+          <a:noFill/>
+        </p:spPr>
+        <p:txBody>
+          <a:bodyPr wrap="square" rtlCol="0">
+            <a:spAutoFit/>
+          </a:bodyPr>
+          <a:lstStyle/>
+          <a:p>
+            <a:r>
+              <a:rPr lang="en-US" sz="3000" b="1" dirty="0">
+                <a:solidFill>
+                  <a:schemeClr val="accent1"/>
+                </a:solidFill>
+                <a:latin typeface="Cambria" panose="02040503050406030204" pitchFamily="18" charset="0"/>
+              </a:rPr>
+              <a:t>7</a:t>
+            </a:r>
+            <a:r>
+              <a:rPr lang="en-US" sz="3000" b="1" dirty="0">
+                <a:solidFill>
+                  <a:schemeClr val="accent1"/>
+                </a:solidFill>
+                <a:latin typeface="Cambria" panose="02040503050406030204" pitchFamily="18" charset="0"/>
+              </a:rPr>
+              <a:t>. READ EVAL PRINT (REPL)</a:t>
+            </a:r>
+          </a:p>
+        </p:txBody>
+      </p:sp>
+      <p:pic>
+        <p:nvPicPr>
+          <p:cNvPr id="5" name="Picture 4"/>
+          <p:cNvPicPr>
+            <a:picLocks noChangeAspect="1"/>
+          </p:cNvPicPr>
+          <p:nvPr/>
+        </p:nvPicPr>
+        <p:blipFill>
+          <a:blip r:embed="rId2"/>
+          <a:stretch>
+            <a:fillRect/>
+          </a:stretch>
+        </p:blipFill>
+        <p:spPr>
+          <a:xfrm>
+            <a:off x="1937699" y="1080649"/>
+            <a:ext cx="7239000" cy="4927600"/>
+          </a:xfrm>
+          <a:prstGeom prst="rect">
+            <a:avLst/>
+          </a:prstGeom>
+        </p:spPr>
+      </p:pic>
+    </p:spTree>
+    <p:extLst>
+      <p:ext uri="{BB962C8B-B14F-4D97-AF65-F5344CB8AC3E}">
+        <p14:creationId xmlns:p14="http://schemas.microsoft.com/office/powerpoint/2010/main" val="1187688882"/>
+      </p:ext>
+    </p:extLst>
+  </p:cSld>
+  <p:clrMapOvr>
+    <a:masterClrMapping/>
+  </p:clrMapOvr>
+</p:sld>
+</file>
+
+<file path=ppt/slides/slide23.xml><?xml version="1.0" encoding="utf-8"?>
+<p:sld xmlns:a="http://schemas.openxmlformats.org/drawingml/2006/main" xmlns:r="http://schemas.openxmlformats.org/officeDocument/2006/relationships" xmlns:p="http://schemas.openxmlformats.org/presentationml/2006/main">
+  <p:cSld>
+    <p:spTree>
+      <p:nvGrpSpPr>
+        <p:cNvPr id="1" name=""/>
+        <p:cNvGrpSpPr/>
+        <p:nvPr/>
+      </p:nvGrpSpPr>
+      <p:grpSpPr>
+        <a:xfrm>
+          <a:off x="0" y="0"/>
+          <a:ext cx="0" cy="0"/>
+          <a:chOff x="0" y="0"/>
+          <a:chExt cx="0" cy="0"/>
+        </a:xfrm>
+      </p:grpSpPr>
+      <p:sp>
+        <p:nvSpPr>
+          <p:cNvPr id="4" name="TextBox 3"/>
+          <p:cNvSpPr txBox="1"/>
+          <p:nvPr/>
+        </p:nvSpPr>
+        <p:spPr>
+          <a:xfrm>
+            <a:off x="1951685" y="435184"/>
+            <a:ext cx="9324671" cy="553998"/>
+          </a:xfrm>
+          <a:prstGeom prst="rect">
+            <a:avLst/>
+          </a:prstGeom>
+          <a:noFill/>
+        </p:spPr>
+        <p:txBody>
+          <a:bodyPr wrap="square" rtlCol="0">
+            <a:spAutoFit/>
+          </a:bodyPr>
+          <a:lstStyle/>
+          <a:p>
+            <a:r>
+              <a:rPr lang="en-US" sz="3000" b="1" dirty="0">
+                <a:solidFill>
+                  <a:schemeClr val="accent1"/>
+                </a:solidFill>
+                <a:latin typeface="Cambria" panose="02040503050406030204" pitchFamily="18" charset="0"/>
+              </a:rPr>
+              <a:t>7</a:t>
+            </a:r>
+            <a:r>
+              <a:rPr lang="en-US" sz="3000" b="1" dirty="0">
+                <a:solidFill>
+                  <a:schemeClr val="accent1"/>
+                </a:solidFill>
+                <a:latin typeface="Cambria" panose="02040503050406030204" pitchFamily="18" charset="0"/>
+              </a:rPr>
+              <a:t>. READ EVAL PRINT (REPL)</a:t>
+            </a:r>
+          </a:p>
+        </p:txBody>
+      </p:sp>
+      <p:sp>
+        <p:nvSpPr>
+          <p:cNvPr id="6" name="TextBox 5"/>
+          <p:cNvSpPr txBox="1"/>
+          <p:nvPr/>
+        </p:nvSpPr>
+        <p:spPr>
+          <a:xfrm>
+            <a:off x="2091750" y="1638460"/>
+            <a:ext cx="9909364" cy="553998"/>
+          </a:xfrm>
+          <a:prstGeom prst="rect">
+            <a:avLst/>
+          </a:prstGeom>
+          <a:noFill/>
+        </p:spPr>
+        <p:txBody>
+          <a:bodyPr wrap="square" rtlCol="0">
+            <a:spAutoFit/>
+          </a:bodyPr>
+          <a:lstStyle/>
+          <a:p>
+            <a:r>
+              <a:rPr lang="en-US" sz="2000" b="1" dirty="0">
+                <a:solidFill>
+                  <a:schemeClr val="accent1"/>
+                </a:solidFill>
+                <a:latin typeface="Cambria" panose="02040503050406030204" pitchFamily="18" charset="0"/>
+              </a:rPr>
+              <a:t>WRITE </a:t>
+            </a:r>
+            <a:r>
+              <a:rPr lang="en-US" sz="3000" b="1" dirty="0">
+                <a:solidFill>
+                  <a:schemeClr val="accent6"/>
+                </a:solidFill>
+                <a:latin typeface="Cambria" panose="02040503050406030204" pitchFamily="18" charset="0"/>
+              </a:rPr>
+              <a:t>2+ 2 </a:t>
+            </a:r>
+            <a:r>
+              <a:rPr lang="en-US" sz="2000" b="1" dirty="0">
+                <a:solidFill>
+                  <a:schemeClr val="accent1"/>
+                </a:solidFill>
+                <a:latin typeface="Cambria" panose="02040503050406030204" pitchFamily="18" charset="0"/>
+              </a:rPr>
+              <a:t>after the </a:t>
+            </a:r>
+            <a:r>
+              <a:rPr lang="en-US" sz="3000" b="1" dirty="0">
+                <a:solidFill>
+                  <a:srgbClr val="DF5327"/>
+                </a:solidFill>
+                <a:latin typeface="Cambria" panose="02040503050406030204" pitchFamily="18" charset="0"/>
+              </a:rPr>
+              <a:t>&gt;&gt;&gt;</a:t>
+            </a:r>
+            <a:r>
+              <a:rPr lang="en-US" sz="2000" b="1" dirty="0">
+                <a:solidFill>
+                  <a:schemeClr val="accent1"/>
+                </a:solidFill>
+                <a:latin typeface="Cambria" panose="02040503050406030204" pitchFamily="18" charset="0"/>
+              </a:rPr>
+              <a:t> sign and press </a:t>
+            </a:r>
+            <a:r>
+              <a:rPr lang="en-US" sz="3000" b="1" dirty="0">
+                <a:solidFill>
+                  <a:srgbClr val="DF5327"/>
+                </a:solidFill>
+                <a:latin typeface="Cambria" panose="02040503050406030204" pitchFamily="18" charset="0"/>
+              </a:rPr>
+              <a:t>Enter Key</a:t>
+            </a:r>
+          </a:p>
+        </p:txBody>
+      </p:sp>
+      <p:sp>
+        <p:nvSpPr>
+          <p:cNvPr id="7" name="TextBox 6"/>
+          <p:cNvSpPr txBox="1"/>
+          <p:nvPr/>
+        </p:nvSpPr>
+        <p:spPr>
+          <a:xfrm>
+            <a:off x="2077378" y="2342449"/>
+            <a:ext cx="9909364" cy="861774"/>
+          </a:xfrm>
+          <a:prstGeom prst="rect">
+            <a:avLst/>
+          </a:prstGeom>
+          <a:noFill/>
+        </p:spPr>
+        <p:txBody>
+          <a:bodyPr wrap="square" rtlCol="0">
+            <a:spAutoFit/>
+          </a:bodyPr>
+          <a:lstStyle/>
+          <a:p>
+            <a:r>
+              <a:rPr lang="en-US" sz="2000" b="1" dirty="0">
+                <a:solidFill>
+                  <a:schemeClr val="accent1"/>
+                </a:solidFill>
+                <a:latin typeface="Cambria" panose="02040503050406030204" pitchFamily="18" charset="0"/>
+              </a:rPr>
+              <a:t>WRITE </a:t>
+            </a:r>
+            <a:r>
+              <a:rPr lang="en-US" sz="3000" b="1" dirty="0">
+                <a:solidFill>
+                  <a:srgbClr val="DF5327"/>
+                </a:solidFill>
+                <a:latin typeface="Cambria" panose="02040503050406030204" pitchFamily="18" charset="0"/>
+              </a:rPr>
+              <a:t>print(“Hello IoT!”) </a:t>
+            </a:r>
+            <a:r>
+              <a:rPr lang="en-US" sz="2000" b="1" dirty="0">
+                <a:solidFill>
+                  <a:schemeClr val="accent1"/>
+                </a:solidFill>
+                <a:latin typeface="Cambria" panose="02040503050406030204" pitchFamily="18" charset="0"/>
+              </a:rPr>
+              <a:t>after the </a:t>
+            </a:r>
+            <a:r>
+              <a:rPr lang="en-US" sz="3000" b="1" dirty="0">
+                <a:solidFill>
+                  <a:srgbClr val="DF5327"/>
+                </a:solidFill>
+                <a:latin typeface="Cambria" panose="02040503050406030204" pitchFamily="18" charset="0"/>
+              </a:rPr>
+              <a:t>&gt;&gt;&gt;</a:t>
+            </a:r>
+            <a:r>
+              <a:rPr lang="en-US" sz="2000" b="1" dirty="0">
+                <a:solidFill>
+                  <a:schemeClr val="accent1"/>
+                </a:solidFill>
+                <a:latin typeface="Cambria" panose="02040503050406030204" pitchFamily="18" charset="0"/>
+              </a:rPr>
+              <a:t> sign and press </a:t>
+            </a:r>
+            <a:r>
+              <a:rPr lang="en-US" sz="3000" b="1" dirty="0">
+                <a:solidFill>
+                  <a:srgbClr val="DF5327"/>
+                </a:solidFill>
+                <a:latin typeface="Cambria" panose="02040503050406030204" pitchFamily="18" charset="0"/>
+              </a:rPr>
+              <a:t>Enter Key</a:t>
+            </a:r>
+          </a:p>
+          <a:p>
+            <a:endParaRPr lang="en-US" sz="2000" b="1" dirty="0">
+              <a:solidFill>
+                <a:schemeClr val="accent1"/>
+              </a:solidFill>
+              <a:latin typeface="Cambria" panose="02040503050406030204" pitchFamily="18" charset="0"/>
+            </a:endParaRPr>
+          </a:p>
+        </p:txBody>
+      </p:sp>
+      <p:pic>
+        <p:nvPicPr>
+          <p:cNvPr id="2" name="Picture 1"/>
+          <p:cNvPicPr>
+            <a:picLocks noChangeAspect="1"/>
+          </p:cNvPicPr>
+          <p:nvPr/>
+        </p:nvPicPr>
+        <p:blipFill>
+          <a:blip r:embed="rId2"/>
+          <a:stretch>
+            <a:fillRect/>
+          </a:stretch>
+        </p:blipFill>
+        <p:spPr>
+          <a:xfrm>
+            <a:off x="2218094" y="3244503"/>
+            <a:ext cx="4825540" cy="2707543"/>
+          </a:xfrm>
+          <a:prstGeom prst="rect">
+            <a:avLst/>
+          </a:prstGeom>
+        </p:spPr>
+      </p:pic>
+    </p:spTree>
+    <p:extLst>
+      <p:ext uri="{BB962C8B-B14F-4D97-AF65-F5344CB8AC3E}">
+        <p14:creationId xmlns:p14="http://schemas.microsoft.com/office/powerpoint/2010/main" val="41216149"/>
+      </p:ext>
+    </p:extLst>
+  </p:cSld>
+  <p:clrMapOvr>
+    <a:masterClrMapping/>
+  </p:clrMapOvr>
+</p:sld>
+</file>
+
+<file path=ppt/slides/slide24.xml><?xml version="1.0" encoding="utf-8"?>
+<p:sld xmlns:a="http://schemas.openxmlformats.org/drawingml/2006/main" xmlns:r="http://schemas.openxmlformats.org/officeDocument/2006/relationships" xmlns:p="http://schemas.openxmlformats.org/presentationml/2006/main">
+  <p:cSld>
+    <p:spTree>
+      <p:nvGrpSpPr>
+        <p:cNvPr id="1" name=""/>
+        <p:cNvGrpSpPr/>
+        <p:nvPr/>
+      </p:nvGrpSpPr>
+      <p:grpSpPr>
+        <a:xfrm>
+          <a:off x="0" y="0"/>
+          <a:ext cx="0" cy="0"/>
+          <a:chOff x="0" y="0"/>
+          <a:chExt cx="0" cy="0"/>
+        </a:xfrm>
+      </p:grpSpPr>
+      <p:sp>
+        <p:nvSpPr>
+          <p:cNvPr id="4" name="TextBox 3"/>
+          <p:cNvSpPr txBox="1"/>
+          <p:nvPr/>
+        </p:nvSpPr>
+        <p:spPr>
+          <a:xfrm>
+            <a:off x="1951685" y="435184"/>
+            <a:ext cx="9324671" cy="1015663"/>
+          </a:xfrm>
+          <a:prstGeom prst="rect">
+            <a:avLst/>
+          </a:prstGeom>
+          <a:noFill/>
+        </p:spPr>
+        <p:txBody>
+          <a:bodyPr wrap="square" rtlCol="0">
+            <a:spAutoFit/>
+          </a:bodyPr>
+          <a:lstStyle/>
+          <a:p>
+            <a:r>
+              <a:rPr lang="en-US" sz="3000" b="1" dirty="0">
+                <a:solidFill>
+                  <a:schemeClr val="accent1"/>
+                </a:solidFill>
+                <a:latin typeface="Cambria" panose="02040503050406030204" pitchFamily="18" charset="0"/>
+              </a:rPr>
+              <a:t>7. READ EVAL PRINT (REPL)</a:t>
+            </a:r>
+          </a:p>
+          <a:p>
+            <a:endParaRPr lang="en-US" sz="3000" b="1" dirty="0">
+              <a:solidFill>
+                <a:schemeClr val="accent1"/>
+              </a:solidFill>
+              <a:latin typeface="Cambria" panose="02040503050406030204" pitchFamily="18" charset="0"/>
+            </a:endParaRPr>
+          </a:p>
+        </p:txBody>
+      </p:sp>
+      <p:pic>
+        <p:nvPicPr>
+          <p:cNvPr id="2" name="Picture 1"/>
+          <p:cNvPicPr>
+            <a:picLocks noChangeAspect="1"/>
+          </p:cNvPicPr>
+          <p:nvPr/>
+        </p:nvPicPr>
+        <p:blipFill>
+          <a:blip r:embed="rId2"/>
+          <a:stretch>
+            <a:fillRect/>
+          </a:stretch>
+        </p:blipFill>
+        <p:spPr>
+          <a:xfrm>
+            <a:off x="1873555" y="1093477"/>
+            <a:ext cx="7239000" cy="4927600"/>
+          </a:xfrm>
+          <a:prstGeom prst="rect">
+            <a:avLst/>
+          </a:prstGeom>
+        </p:spPr>
+      </p:pic>
+    </p:spTree>
+    <p:extLst>
+      <p:ext uri="{BB962C8B-B14F-4D97-AF65-F5344CB8AC3E}">
+        <p14:creationId xmlns:p14="http://schemas.microsoft.com/office/powerpoint/2010/main" val="1187688882"/>
+      </p:ext>
+    </p:extLst>
+  </p:cSld>
+  <p:clrMapOvr>
+    <a:masterClrMapping/>
+  </p:clrMapOvr>
+</p:sld>
+</file>
+
+<file path=ppt/slides/slide25.xml><?xml version="1.0" encoding="utf-8"?>
+<p:sld xmlns:a="http://schemas.openxmlformats.org/drawingml/2006/main" xmlns:r="http://schemas.openxmlformats.org/officeDocument/2006/relationships" xmlns:p="http://schemas.openxmlformats.org/presentationml/2006/main">
+  <p:cSld>
+    <p:spTree>
+      <p:nvGrpSpPr>
+        <p:cNvPr id="1" name=""/>
+        <p:cNvGrpSpPr/>
+        <p:nvPr/>
+      </p:nvGrpSpPr>
+      <p:grpSpPr>
+        <a:xfrm>
+          <a:off x="0" y="0"/>
+          <a:ext cx="0" cy="0"/>
+          <a:chOff x="0" y="0"/>
+          <a:chExt cx="0" cy="0"/>
+        </a:xfrm>
+      </p:grpSpPr>
+      <p:sp>
+        <p:nvSpPr>
+          <p:cNvPr id="4" name="TextBox 3"/>
+          <p:cNvSpPr txBox="1"/>
+          <p:nvPr/>
+        </p:nvSpPr>
+        <p:spPr>
+          <a:xfrm>
+            <a:off x="1951685" y="435184"/>
+            <a:ext cx="9324671" cy="1015663"/>
+          </a:xfrm>
+          <a:prstGeom prst="rect">
+            <a:avLst/>
+          </a:prstGeom>
+          <a:noFill/>
+        </p:spPr>
+        <p:txBody>
+          <a:bodyPr wrap="square" rtlCol="0">
+            <a:spAutoFit/>
+          </a:bodyPr>
+          <a:lstStyle/>
+          <a:p>
+            <a:r>
+              <a:rPr lang="en-US" sz="3000" b="1" dirty="0">
+                <a:solidFill>
+                  <a:schemeClr val="accent1"/>
+                </a:solidFill>
+                <a:latin typeface="Cambria" panose="02040503050406030204" pitchFamily="18" charset="0"/>
+              </a:rPr>
+              <a:t>8. OPEN A </a:t>
+            </a:r>
+            <a:r>
+              <a:rPr lang="en-US" sz="3000" b="1" dirty="0">
+                <a:solidFill>
+                  <a:schemeClr val="accent1"/>
+                </a:solidFill>
+                <a:latin typeface="Cambria" panose="02040503050406030204" pitchFamily="18" charset="0"/>
+              </a:rPr>
+              <a:t>PROJECT</a:t>
+            </a:r>
+            <a:endParaRPr lang="en-US" sz="3000" b="1" dirty="0">
+              <a:solidFill>
+                <a:schemeClr val="accent1"/>
+              </a:solidFill>
+              <a:latin typeface="Cambria" panose="02040503050406030204" pitchFamily="18" charset="0"/>
+            </a:endParaRPr>
+          </a:p>
+          <a:p>
+            <a:endParaRPr lang="en-US" sz="3000" b="1" dirty="0">
+              <a:solidFill>
+                <a:schemeClr val="accent1"/>
+              </a:solidFill>
+              <a:latin typeface="Cambria" panose="02040503050406030204" pitchFamily="18" charset="0"/>
+            </a:endParaRPr>
+          </a:p>
+        </p:txBody>
+      </p:sp>
+    </p:spTree>
+    <p:extLst>
+      <p:ext uri="{BB962C8B-B14F-4D97-AF65-F5344CB8AC3E}">
+        <p14:creationId xmlns:p14="http://schemas.microsoft.com/office/powerpoint/2010/main" val="599882355"/>
+      </p:ext>
+    </p:extLst>
+  </p:cSld>
+  <p:clrMapOvr>
+    <a:masterClrMapping/>
+  </p:clrMapOvr>
+</p:sld>
+</file>
+
+<file path=ppt/slides/slide26.xml><?xml version="1.0" encoding="utf-8"?>
+<p:sld xmlns:a="http://schemas.openxmlformats.org/drawingml/2006/main" xmlns:r="http://schemas.openxmlformats.org/officeDocument/2006/relationships" xmlns:p="http://schemas.openxmlformats.org/presentationml/2006/main">
+  <p:cSld>
+    <p:spTree>
+      <p:nvGrpSpPr>
+        <p:cNvPr id="1" name=""/>
+        <p:cNvGrpSpPr/>
+        <p:nvPr/>
+      </p:nvGrpSpPr>
+      <p:grpSpPr>
+        <a:xfrm>
+          <a:off x="0" y="0"/>
+          <a:ext cx="0" cy="0"/>
+          <a:chOff x="0" y="0"/>
+          <a:chExt cx="0" cy="0"/>
+        </a:xfrm>
+      </p:grpSpPr>
+      <p:sp>
+        <p:nvSpPr>
+          <p:cNvPr id="2" name="Title 1"/>
+          <p:cNvSpPr>
+            <a:spLocks noGrp="1"/>
+          </p:cNvSpPr>
+          <p:nvPr>
+            <p:ph type="title"/>
+          </p:nvPr>
+        </p:nvSpPr>
+        <p:spPr>
+          <a:xfrm>
+            <a:off x="1058333" y="2874439"/>
+            <a:ext cx="5036820" cy="807721"/>
+          </a:xfrm>
+        </p:spPr>
+        <p:txBody>
+          <a:bodyPr/>
+          <a:lstStyle/>
+          <a:p>
+            <a:r>
+              <a:rPr lang="en-US" dirty="0" smtClean="0">
+                <a:solidFill>
+                  <a:schemeClr val="accent1"/>
+                </a:solidFill>
+              </a:rPr>
+              <a:t>THANK YOU</a:t>
+            </a:r>
+            <a:endParaRPr lang="en-US" dirty="0">
+              <a:solidFill>
+                <a:schemeClr val="accent1"/>
+              </a:solidFill>
+            </a:endParaRPr>
+          </a:p>
+        </p:txBody>
+      </p:sp>
+    </p:spTree>
+    <p:extLst>
+      <p:ext uri="{BB962C8B-B14F-4D97-AF65-F5344CB8AC3E}">
+        <p14:creationId xmlns:p14="http://schemas.microsoft.com/office/powerpoint/2010/main" val="3105801543"/>
+      </p:ext>
+    </p:extLst>
+  </p:cSld>
+  <p:clrMapOvr>
+    <a:masterClrMapping/>
+  </p:clrMapOvr>
   <p:timing>
     <p:tnLst>
       <p:par>
@@ -5133,7 +6789,7 @@
         </p:blipFill>
         <p:spPr>
           <a:xfrm>
-            <a:off x="4582506" y="5998625"/>
+            <a:off x="4813422" y="5998626"/>
             <a:ext cx="1773279" cy="556323"/>
           </a:xfrm>
           <a:prstGeom prst="rect">
@@ -5205,7 +6861,7 @@
         </p:blipFill>
         <p:spPr>
           <a:xfrm>
-            <a:off x="7015998" y="910629"/>
+            <a:off x="6733769" y="756698"/>
             <a:ext cx="1438063" cy="571861"/>
           </a:xfrm>
           <a:prstGeom prst="rect">
@@ -5271,15 +6927,15 @@
           <p:nvPr/>
         </p:nvPicPr>
         <p:blipFill>
-          <a:blip r:embed="rId3"/>
+          <a:blip r:embed="rId2"/>
           <a:stretch>
             <a:fillRect/>
           </a:stretch>
         </p:blipFill>
         <p:spPr>
           <a:xfrm>
-            <a:off x="2542580" y="753386"/>
-            <a:ext cx="6605506" cy="5211487"/>
+            <a:off x="3102678" y="795317"/>
+            <a:ext cx="5229601" cy="5549576"/>
           </a:xfrm>
           <a:prstGeom prst="rect">
             <a:avLst/>
@@ -5289,25 +6945,13 @@
     </p:spTree>
     <p:extLst>
       <p:ext uri="{BB962C8B-B14F-4D97-AF65-F5344CB8AC3E}">
-        <p14:creationId xmlns:p14="http://schemas.microsoft.com/office/powerpoint/2010/main" val="776234312"/>
+        <p14:creationId xmlns:p14="http://schemas.microsoft.com/office/powerpoint/2010/main" val="1430600241"/>
       </p:ext>
     </p:extLst>
   </p:cSld>
   <p:clrMapOvr>
     <a:masterClrMapping/>
   </p:clrMapOvr>
-  <mc:AlternateContent xmlns:mc="http://schemas.openxmlformats.org/markup-compatibility/2006" xmlns:p14="http://schemas.microsoft.com/office/powerpoint/2010/main">
-    <mc:Choice Requires="p14">
-      <p:transition spd="med" p14:dur="700">
-        <p:fade/>
-      </p:transition>
-    </mc:Choice>
-    <mc:Fallback xmlns="">
-      <p:transition spd="med">
-        <p:fade/>
-      </p:transition>
-    </mc:Fallback>
-  </mc:AlternateContent>
   <p:timing>
     <p:tnLst>
       <p:par>
@@ -5335,79 +6979,24 @@
           <a:chExt cx="0" cy="0"/>
         </a:xfrm>
       </p:grpSpPr>
-      <p:sp>
-        <p:nvSpPr>
-          <p:cNvPr id="2" name="Rectangle 1"/>
-          <p:cNvSpPr/>
-          <p:nvPr/>
-        </p:nvSpPr>
-        <p:spPr>
-          <a:xfrm>
-            <a:off x="2869841" y="5008043"/>
-            <a:ext cx="2569934" cy="369332"/>
-          </a:xfrm>
-          <a:prstGeom prst="rect">
-            <a:avLst/>
-          </a:prstGeom>
-        </p:spPr>
-        <p:txBody>
-          <a:bodyPr wrap="none">
-            <a:spAutoFit/>
-          </a:bodyPr>
-          <a:lstStyle/>
-          <a:p>
-            <a:r>
-              <a:rPr lang="en-US">
-                <a:hlinkClick r:id="rId3"/>
-              </a:rPr>
-              <a:t>https://micropython.org/</a:t>
-            </a:r>
-            <a:endParaRPr lang="en-US"/>
-          </a:p>
-        </p:txBody>
-      </p:sp>
       <p:pic>
         <p:nvPicPr>
-          <p:cNvPr id="4" name="Picture 3"/>
+          <p:cNvPr id="2" name="Picture 1"/>
           <p:cNvPicPr>
             <a:picLocks noChangeAspect="1"/>
           </p:cNvPicPr>
           <p:nvPr/>
         </p:nvPicPr>
         <p:blipFill>
-          <a:blip r:embed="rId4"/>
+          <a:blip r:embed="rId2"/>
           <a:stretch>
             <a:fillRect/>
           </a:stretch>
         </p:blipFill>
         <p:spPr>
           <a:xfrm>
-            <a:off x="2845780" y="1043157"/>
-            <a:ext cx="2630946" cy="825395"/>
-          </a:xfrm>
-          <a:prstGeom prst="rect">
-            <a:avLst/>
-          </a:prstGeom>
-        </p:spPr>
-      </p:pic>
-      <p:pic>
-        <p:nvPicPr>
-          <p:cNvPr id="3" name="Picture 2"/>
-          <p:cNvPicPr>
-            <a:picLocks noChangeAspect="1"/>
-          </p:cNvPicPr>
-          <p:nvPr/>
-        </p:nvPicPr>
-        <p:blipFill>
-          <a:blip r:embed="rId5"/>
-          <a:stretch>
-            <a:fillRect/>
-          </a:stretch>
-        </p:blipFill>
-        <p:spPr>
-          <a:xfrm>
-            <a:off x="2779287" y="2046559"/>
-            <a:ext cx="6337300" cy="2946400"/>
+            <a:off x="3661588" y="307865"/>
+            <a:ext cx="4972074" cy="6036136"/>
           </a:xfrm>
           <a:prstGeom prst="rect">
             <a:avLst/>
@@ -5417,25 +7006,13 @@
     </p:spTree>
     <p:extLst>
       <p:ext uri="{BB962C8B-B14F-4D97-AF65-F5344CB8AC3E}">
-        <p14:creationId xmlns:p14="http://schemas.microsoft.com/office/powerpoint/2010/main" val="1836121879"/>
+        <p14:creationId xmlns:p14="http://schemas.microsoft.com/office/powerpoint/2010/main" val="2080530420"/>
       </p:ext>
     </p:extLst>
   </p:cSld>
   <p:clrMapOvr>
     <a:masterClrMapping/>
   </p:clrMapOvr>
-  <mc:AlternateContent xmlns:mc="http://schemas.openxmlformats.org/markup-compatibility/2006" xmlns:p14="http://schemas.microsoft.com/office/powerpoint/2010/main">
-    <mc:Choice Requires="p14">
-      <p:transition spd="med" p14:dur="700">
-        <p:fade/>
-      </p:transition>
-    </mc:Choice>
-    <mc:Fallback xmlns="">
-      <p:transition spd="med">
-        <p:fade/>
-      </p:transition>
-    </mc:Fallback>
-  </mc:AlternateContent>
   <p:timing>
     <p:tnLst>
       <p:par>
@@ -5463,40 +7040,33 @@
           <a:chExt cx="0" cy="0"/>
         </a:xfrm>
       </p:grpSpPr>
-      <p:sp>
-        <p:nvSpPr>
-          <p:cNvPr id="2" name="Rectangle 1"/>
-          <p:cNvSpPr/>
-          <p:nvPr/>
-        </p:nvSpPr>
-        <p:spPr>
-          <a:xfrm>
-            <a:off x="2869841" y="5008043"/>
-            <a:ext cx="2569934" cy="369332"/>
-          </a:xfrm>
-          <a:prstGeom prst="rect">
-            <a:avLst/>
-          </a:prstGeom>
-        </p:spPr>
-        <p:txBody>
-          <a:bodyPr wrap="none">
-            <a:spAutoFit/>
-          </a:bodyPr>
-          <a:lstStyle/>
-          <a:p>
-            <a:r>
-              <a:rPr lang="en-US">
-                <a:hlinkClick r:id="rId3"/>
-              </a:rPr>
-              <a:t>https://micropython.org/</a:t>
-            </a:r>
-            <a:endParaRPr lang="en-US"/>
-          </a:p>
-        </p:txBody>
-      </p:sp>
       <p:pic>
         <p:nvPicPr>
           <p:cNvPr id="4" name="Picture 3"/>
+          <p:cNvPicPr>
+            <a:picLocks noChangeAspect="1"/>
+          </p:cNvPicPr>
+          <p:nvPr/>
+        </p:nvPicPr>
+        <p:blipFill>
+          <a:blip r:embed="rId3"/>
+          <a:stretch>
+            <a:fillRect/>
+          </a:stretch>
+        </p:blipFill>
+        <p:spPr>
+          <a:xfrm>
+            <a:off x="2043571" y="1372562"/>
+            <a:ext cx="7167380" cy="4554358"/>
+          </a:xfrm>
+          <a:prstGeom prst="rect">
+            <a:avLst/>
+          </a:prstGeom>
+        </p:spPr>
+      </p:pic>
+      <p:pic>
+        <p:nvPicPr>
+          <p:cNvPr id="6" name="Picture 5"/>
           <p:cNvPicPr>
             <a:picLocks noChangeAspect="1"/>
           </p:cNvPicPr>
@@ -5510,8 +7080,8 @@
         </p:blipFill>
         <p:spPr>
           <a:xfrm>
-            <a:off x="2845780" y="1043157"/>
-            <a:ext cx="2630946" cy="825395"/>
+            <a:off x="4813422" y="5998626"/>
+            <a:ext cx="1773279" cy="556323"/>
           </a:xfrm>
           <a:prstGeom prst="rect">
             <a:avLst/>
@@ -5520,7 +7090,7 @@
       </p:pic>
       <p:pic>
         <p:nvPicPr>
-          <p:cNvPr id="3" name="Picture 2"/>
+          <p:cNvPr id="8" name="Picture 7"/>
           <p:cNvPicPr>
             <a:picLocks noChangeAspect="1"/>
           </p:cNvPicPr>
@@ -5534,8 +7104,56 @@
         </p:blipFill>
         <p:spPr>
           <a:xfrm>
-            <a:off x="2779287" y="2046559"/>
-            <a:ext cx="6337300" cy="2946400"/>
+            <a:off x="4089272" y="689877"/>
+            <a:ext cx="2171095" cy="652023"/>
+          </a:xfrm>
+          <a:prstGeom prst="rect">
+            <a:avLst/>
+          </a:prstGeom>
+        </p:spPr>
+      </p:pic>
+      <p:pic>
+        <p:nvPicPr>
+          <p:cNvPr id="9" name="Picture 8"/>
+          <p:cNvPicPr>
+            <a:picLocks noChangeAspect="1"/>
+          </p:cNvPicPr>
+          <p:nvPr/>
+        </p:nvPicPr>
+        <p:blipFill>
+          <a:blip r:embed="rId6"/>
+          <a:stretch>
+            <a:fillRect/>
+          </a:stretch>
+        </p:blipFill>
+        <p:spPr>
+          <a:xfrm>
+            <a:off x="1884294" y="1113189"/>
+            <a:ext cx="1746206" cy="480465"/>
+          </a:xfrm>
+          <a:prstGeom prst="rect">
+            <a:avLst/>
+          </a:prstGeom>
+        </p:spPr>
+      </p:pic>
+      <p:pic>
+        <p:nvPicPr>
+          <p:cNvPr id="10" name="Picture 9"/>
+          <p:cNvPicPr>
+            <a:picLocks noChangeAspect="1"/>
+          </p:cNvPicPr>
+          <p:nvPr/>
+        </p:nvPicPr>
+        <p:blipFill>
+          <a:blip r:embed="rId7"/>
+          <a:stretch>
+            <a:fillRect/>
+          </a:stretch>
+        </p:blipFill>
+        <p:spPr>
+          <a:xfrm>
+            <a:off x="6733769" y="756698"/>
+            <a:ext cx="1438063" cy="571861"/>
           </a:xfrm>
           <a:prstGeom prst="rect">
             <a:avLst/>
@@ -5545,7 +7163,7 @@
     </p:spTree>
     <p:extLst>
       <p:ext uri="{BB962C8B-B14F-4D97-AF65-F5344CB8AC3E}">
-        <p14:creationId xmlns:p14="http://schemas.microsoft.com/office/powerpoint/2010/main" val="2220982439"/>
+        <p14:creationId xmlns:p14="http://schemas.microsoft.com/office/powerpoint/2010/main" val="880234144"/>
       </p:ext>
     </p:extLst>
   </p:cSld>
@@ -5591,79 +7209,24 @@
           <a:chExt cx="0" cy="0"/>
         </a:xfrm>
       </p:grpSpPr>
-      <p:sp>
-        <p:nvSpPr>
-          <p:cNvPr id="2" name="Rectangle 1"/>
-          <p:cNvSpPr/>
-          <p:nvPr/>
-        </p:nvSpPr>
-        <p:spPr>
-          <a:xfrm>
-            <a:off x="2869841" y="5008043"/>
-            <a:ext cx="2569934" cy="369332"/>
-          </a:xfrm>
-          <a:prstGeom prst="rect">
-            <a:avLst/>
-          </a:prstGeom>
-        </p:spPr>
-        <p:txBody>
-          <a:bodyPr wrap="none">
-            <a:spAutoFit/>
-          </a:bodyPr>
-          <a:lstStyle/>
-          <a:p>
-            <a:r>
-              <a:rPr lang="en-US">
-                <a:hlinkClick r:id="rId3"/>
-              </a:rPr>
-              <a:t>https://micropython.org/</a:t>
-            </a:r>
-            <a:endParaRPr lang="en-US"/>
-          </a:p>
-        </p:txBody>
-      </p:sp>
       <p:pic>
         <p:nvPicPr>
-          <p:cNvPr id="4" name="Picture 3"/>
+          <p:cNvPr id="5" name="Picture 4"/>
           <p:cNvPicPr>
             <a:picLocks noChangeAspect="1"/>
           </p:cNvPicPr>
           <p:nvPr/>
         </p:nvPicPr>
         <p:blipFill>
-          <a:blip r:embed="rId4"/>
+          <a:blip r:embed="rId3"/>
           <a:stretch>
             <a:fillRect/>
           </a:stretch>
         </p:blipFill>
         <p:spPr>
           <a:xfrm>
-            <a:off x="2845780" y="1043157"/>
-            <a:ext cx="2630946" cy="825395"/>
-          </a:xfrm>
-          <a:prstGeom prst="rect">
-            <a:avLst/>
-          </a:prstGeom>
-        </p:spPr>
-      </p:pic>
-      <p:pic>
-        <p:nvPicPr>
-          <p:cNvPr id="3" name="Picture 2"/>
-          <p:cNvPicPr>
-            <a:picLocks noChangeAspect="1"/>
-          </p:cNvPicPr>
-          <p:nvPr/>
-        </p:nvPicPr>
-        <p:blipFill>
-          <a:blip r:embed="rId5"/>
-          <a:stretch>
-            <a:fillRect/>
-          </a:stretch>
-        </p:blipFill>
-        <p:spPr>
-          <a:xfrm>
-            <a:off x="2779287" y="2046559"/>
-            <a:ext cx="6337300" cy="2946400"/>
+            <a:off x="2542580" y="753386"/>
+            <a:ext cx="6605506" cy="5211487"/>
           </a:xfrm>
           <a:prstGeom prst="rect">
             <a:avLst/>
@@ -5673,7 +7236,7 @@
     </p:spTree>
     <p:extLst>
       <p:ext uri="{BB962C8B-B14F-4D97-AF65-F5344CB8AC3E}">
-        <p14:creationId xmlns:p14="http://schemas.microsoft.com/office/powerpoint/2010/main" val="2889221614"/>
+        <p14:creationId xmlns:p14="http://schemas.microsoft.com/office/powerpoint/2010/main" val="776234312"/>
       </p:ext>
     </p:extLst>
   </p:cSld>
@@ -5719,33 +7282,40 @@
           <a:chExt cx="0" cy="0"/>
         </a:xfrm>
       </p:grpSpPr>
+      <p:sp>
+        <p:nvSpPr>
+          <p:cNvPr id="2" name="Rectangle 1"/>
+          <p:cNvSpPr/>
+          <p:nvPr/>
+        </p:nvSpPr>
+        <p:spPr>
+          <a:xfrm>
+            <a:off x="2792867" y="4995215"/>
+            <a:ext cx="2569934" cy="369332"/>
+          </a:xfrm>
+          <a:prstGeom prst="rect">
+            <a:avLst/>
+          </a:prstGeom>
+        </p:spPr>
+        <p:txBody>
+          <a:bodyPr wrap="none">
+            <a:spAutoFit/>
+          </a:bodyPr>
+          <a:lstStyle/>
+          <a:p>
+            <a:r>
+              <a:rPr lang="en-US">
+                <a:hlinkClick r:id="rId3"/>
+              </a:rPr>
+              <a:t>https://micropython.org/</a:t>
+            </a:r>
+            <a:endParaRPr lang="en-US"/>
+          </a:p>
+        </p:txBody>
+      </p:sp>
       <p:pic>
         <p:nvPicPr>
-          <p:cNvPr id="7" name="Picture 6"/>
-          <p:cNvPicPr>
-            <a:picLocks noChangeAspect="1"/>
-          </p:cNvPicPr>
-          <p:nvPr/>
-        </p:nvPicPr>
-        <p:blipFill>
-          <a:blip r:embed="rId3"/>
-          <a:stretch>
-            <a:fillRect/>
-          </a:stretch>
-        </p:blipFill>
-        <p:spPr>
-          <a:xfrm>
-            <a:off x="1506285" y="3599726"/>
-            <a:ext cx="3389483" cy="2442112"/>
-          </a:xfrm>
-          <a:prstGeom prst="rect">
-            <a:avLst/>
-          </a:prstGeom>
-        </p:spPr>
-      </p:pic>
-      <p:pic>
-        <p:nvPicPr>
-          <p:cNvPr id="3" name="Picture 2"/>
+          <p:cNvPr id="4" name="Picture 3"/>
           <p:cNvPicPr>
             <a:picLocks noChangeAspect="1"/>
           </p:cNvPicPr>
@@ -5759,8 +7329,32 @@
         </p:blipFill>
         <p:spPr>
           <a:xfrm>
-            <a:off x="2003318" y="841383"/>
-            <a:ext cx="2451100" cy="698500"/>
+            <a:off x="2845780" y="1043157"/>
+            <a:ext cx="2630946" cy="825395"/>
+          </a:xfrm>
+          <a:prstGeom prst="rect">
+            <a:avLst/>
+          </a:prstGeom>
+        </p:spPr>
+      </p:pic>
+      <p:pic>
+        <p:nvPicPr>
+          <p:cNvPr id="3" name="Picture 2"/>
+          <p:cNvPicPr>
+            <a:picLocks noChangeAspect="1"/>
+          </p:cNvPicPr>
+          <p:nvPr/>
+        </p:nvPicPr>
+        <p:blipFill>
+          <a:blip r:embed="rId5"/>
+          <a:stretch>
+            <a:fillRect/>
+          </a:stretch>
+        </p:blipFill>
+        <p:spPr>
+          <a:xfrm>
+            <a:off x="2779287" y="2046559"/>
+            <a:ext cx="6337300" cy="2946400"/>
           </a:xfrm>
           <a:prstGeom prst="rect">
             <a:avLst/>
@@ -5770,7 +7364,7 @@
     </p:spTree>
     <p:extLst>
       <p:ext uri="{BB962C8B-B14F-4D97-AF65-F5344CB8AC3E}">
-        <p14:creationId xmlns:p14="http://schemas.microsoft.com/office/powerpoint/2010/main" val="305623156"/>
+        <p14:creationId xmlns:p14="http://schemas.microsoft.com/office/powerpoint/2010/main" val="1836121879"/>
       </p:ext>
     </p:extLst>
   </p:cSld>

</xml_diff>

<commit_message>
finished session14 and 3 presentations
</commit_message>
<xml_diff>
--- a/presentations/session-3-building-iot-products-programming-aspects.pptx
+++ b/presentations/session-3-building-iot-products-programming-aspects.pptx
@@ -5,7 +5,7 @@
     <p:sldMasterId id="2147483648" r:id="rId1"/>
   </p:sldMasterIdLst>
   <p:notesMasterIdLst>
-    <p:notesMasterId r:id="rId28"/>
+    <p:notesMasterId r:id="rId32"/>
   </p:notesMasterIdLst>
   <p:sldIdLst>
     <p:sldId id="263" r:id="rId2"/>
@@ -33,7 +33,11 @@
     <p:sldId id="530" r:id="rId24"/>
     <p:sldId id="529" r:id="rId25"/>
     <p:sldId id="531" r:id="rId26"/>
-    <p:sldId id="352" r:id="rId27"/>
+    <p:sldId id="532" r:id="rId27"/>
+    <p:sldId id="534" r:id="rId28"/>
+    <p:sldId id="535" r:id="rId29"/>
+    <p:sldId id="533" r:id="rId30"/>
+    <p:sldId id="352" r:id="rId31"/>
   </p:sldIdLst>
   <p:sldSz cx="12192000" cy="6858000"/>
   <p:notesSz cx="6797675" cy="9874250"/>
@@ -6089,7 +6093,7 @@
                 </a:solidFill>
                 <a:latin typeface="Cambria" panose="02040503050406030204" pitchFamily="18" charset="0"/>
               </a:rPr>
-              <a:t>WRITE </a:t>
+              <a:t>write </a:t>
             </a:r>
             <a:r>
               <a:rPr lang="en-US" sz="3000" b="1" dirty="0">
@@ -6168,7 +6172,7 @@
                 </a:solidFill>
                 <a:latin typeface="Cambria" panose="02040503050406030204" pitchFamily="18" charset="0"/>
               </a:rPr>
-              <a:t>WRITE </a:t>
+              <a:t>write </a:t>
             </a:r>
             <a:r>
               <a:rPr lang="en-US" sz="3000" b="1" dirty="0">
@@ -6414,7 +6418,7 @@
                 </a:solidFill>
                 <a:latin typeface="Cambria" panose="02040503050406030204" pitchFamily="18" charset="0"/>
               </a:rPr>
-              <a:t>PROJECT</a:t>
+              <a:t>PROJECT | LED</a:t>
             </a:r>
             <a:endParaRPr lang="en-US" sz="3000" b="1" dirty="0">
               <a:solidFill>
@@ -6433,6 +6437,54 @@
           </a:p>
         </p:txBody>
       </p:sp>
+      <p:pic>
+        <p:nvPicPr>
+          <p:cNvPr id="3" name="Picture 2"/>
+          <p:cNvPicPr>
+            <a:picLocks noChangeAspect="1"/>
+          </p:cNvPicPr>
+          <p:nvPr/>
+        </p:nvPicPr>
+        <p:blipFill>
+          <a:blip r:embed="rId2"/>
+          <a:stretch>
+            <a:fillRect/>
+          </a:stretch>
+        </p:blipFill>
+        <p:spPr>
+          <a:xfrm>
+            <a:off x="2118025" y="1141656"/>
+            <a:ext cx="4270617" cy="1542788"/>
+          </a:xfrm>
+          <a:prstGeom prst="rect">
+            <a:avLst/>
+          </a:prstGeom>
+        </p:spPr>
+      </p:pic>
+      <p:pic>
+        <p:nvPicPr>
+          <p:cNvPr id="5" name="Picture 4"/>
+          <p:cNvPicPr>
+            <a:picLocks noChangeAspect="1"/>
+          </p:cNvPicPr>
+          <p:nvPr/>
+        </p:nvPicPr>
+        <p:blipFill>
+          <a:blip r:embed="rId3"/>
+          <a:stretch>
+            <a:fillRect/>
+          </a:stretch>
+        </p:blipFill>
+        <p:spPr>
+          <a:xfrm>
+            <a:off x="2116712" y="2759416"/>
+            <a:ext cx="8043545" cy="3025554"/>
+          </a:xfrm>
+          <a:prstGeom prst="rect">
+            <a:avLst/>
+          </a:prstGeom>
+        </p:spPr>
+      </p:pic>
     </p:spTree>
     <p:extLst>
       <p:ext uri="{BB962C8B-B14F-4D97-AF65-F5344CB8AC3E}">
@@ -6465,57 +6517,765 @@
       </p:grpSpPr>
       <p:sp>
         <p:nvSpPr>
-          <p:cNvPr id="2" name="Title 1"/>
-          <p:cNvSpPr>
-            <a:spLocks noGrp="1"/>
-          </p:cNvSpPr>
-          <p:nvPr>
-            <p:ph type="title"/>
-          </p:nvPr>
-        </p:nvSpPr>
-        <p:spPr>
-          <a:xfrm>
-            <a:off x="1058333" y="2874439"/>
-            <a:ext cx="5036820" cy="807721"/>
-          </a:xfrm>
-        </p:spPr>
-        <p:txBody>
-          <a:bodyPr/>
-          <a:lstStyle/>
-          <a:p>
-            <a:r>
-              <a:rPr lang="en-US" dirty="0" smtClean="0">
+          <p:cNvPr id="4" name="TextBox 3"/>
+          <p:cNvSpPr txBox="1"/>
+          <p:nvPr/>
+        </p:nvSpPr>
+        <p:spPr>
+          <a:xfrm>
+            <a:off x="1951685" y="435184"/>
+            <a:ext cx="9324671" cy="1015663"/>
+          </a:xfrm>
+          <a:prstGeom prst="rect">
+            <a:avLst/>
+          </a:prstGeom>
+          <a:noFill/>
+        </p:spPr>
+        <p:txBody>
+          <a:bodyPr wrap="square" rtlCol="0">
+            <a:spAutoFit/>
+          </a:bodyPr>
+          <a:lstStyle/>
+          <a:p>
+            <a:r>
+              <a:rPr lang="en-US" sz="3000" b="1" dirty="0">
                 <a:solidFill>
                   <a:schemeClr val="accent1"/>
                 </a:solidFill>
+                <a:latin typeface="Cambria" panose="02040503050406030204" pitchFamily="18" charset="0"/>
               </a:rPr>
-              <a:t>THANK YOU</a:t>
-            </a:r>
-            <a:endParaRPr lang="en-US" dirty="0">
+              <a:t>9. WRITE CODE (main.py, boot.py, …)</a:t>
+            </a:r>
+          </a:p>
+          <a:p>
+            <a:endParaRPr lang="en-US" sz="3000" b="1" dirty="0">
               <a:solidFill>
                 <a:schemeClr val="accent1"/>
               </a:solidFill>
+              <a:latin typeface="Cambria" panose="02040503050406030204" pitchFamily="18" charset="0"/>
             </a:endParaRPr>
+          </a:p>
+        </p:txBody>
+      </p:sp>
+      <p:pic>
+        <p:nvPicPr>
+          <p:cNvPr id="6" name="Picture 5"/>
+          <p:cNvPicPr>
+            <a:picLocks noChangeAspect="1"/>
+          </p:cNvPicPr>
+          <p:nvPr/>
+        </p:nvPicPr>
+        <p:blipFill>
+          <a:blip r:embed="rId2"/>
+          <a:stretch>
+            <a:fillRect/>
+          </a:stretch>
+        </p:blipFill>
+        <p:spPr>
+          <a:xfrm>
+            <a:off x="2077713" y="4331470"/>
+            <a:ext cx="6705600" cy="1689100"/>
+          </a:xfrm>
+          <a:prstGeom prst="rect">
+            <a:avLst/>
+          </a:prstGeom>
+        </p:spPr>
+      </p:pic>
+      <p:pic>
+        <p:nvPicPr>
+          <p:cNvPr id="8" name="Picture 7"/>
+          <p:cNvPicPr>
+            <a:picLocks noChangeAspect="1"/>
+          </p:cNvPicPr>
+          <p:nvPr/>
+        </p:nvPicPr>
+        <p:blipFill>
+          <a:blip r:embed="rId3"/>
+          <a:stretch>
+            <a:fillRect/>
+          </a:stretch>
+        </p:blipFill>
+        <p:spPr>
+          <a:xfrm>
+            <a:off x="2064885" y="1084156"/>
+            <a:ext cx="6705600" cy="3060700"/>
+          </a:xfrm>
+          <a:prstGeom prst="rect">
+            <a:avLst/>
+          </a:prstGeom>
+        </p:spPr>
+      </p:pic>
+      <p:sp>
+        <p:nvSpPr>
+          <p:cNvPr id="10" name="TextBox 9"/>
+          <p:cNvSpPr txBox="1"/>
+          <p:nvPr/>
+        </p:nvSpPr>
+        <p:spPr>
+          <a:xfrm>
+            <a:off x="8796670" y="4781248"/>
+            <a:ext cx="2924053" cy="523220"/>
+          </a:xfrm>
+          <a:prstGeom prst="rect">
+            <a:avLst/>
+          </a:prstGeom>
+          <a:noFill/>
+        </p:spPr>
+        <p:txBody>
+          <a:bodyPr wrap="square" rtlCol="0">
+            <a:spAutoFit/>
+          </a:bodyPr>
+          <a:lstStyle/>
+          <a:p>
+            <a:r>
+              <a:rPr lang="en-US" sz="1400" b="1" dirty="0">
+                <a:solidFill>
+                  <a:schemeClr val="accent1"/>
+                </a:solidFill>
+                <a:latin typeface="Cambria" panose="02040503050406030204" pitchFamily="18" charset="0"/>
+              </a:rPr>
+              <a:t>First Python code executed</a:t>
+            </a:r>
+          </a:p>
+          <a:p>
+            <a:r>
+              <a:rPr lang="en-US" sz="1400" b="1" dirty="0">
+                <a:solidFill>
+                  <a:schemeClr val="accent1"/>
+                </a:solidFill>
+                <a:latin typeface="Cambria" panose="02040503050406030204" pitchFamily="18" charset="0"/>
+              </a:rPr>
+              <a:t>during boot. Here setup the REPL</a:t>
+            </a:r>
+            <a:endParaRPr lang="en-US" sz="1400" b="1" dirty="0">
+              <a:solidFill>
+                <a:srgbClr val="DF5327"/>
+              </a:solidFill>
+              <a:latin typeface="Cambria" panose="02040503050406030204" pitchFamily="18" charset="0"/>
+            </a:endParaRPr>
+          </a:p>
+        </p:txBody>
+      </p:sp>
+      <p:sp>
+        <p:nvSpPr>
+          <p:cNvPr id="11" name="TextBox 10"/>
+          <p:cNvSpPr txBox="1"/>
+          <p:nvPr/>
+        </p:nvSpPr>
+        <p:spPr>
+          <a:xfrm>
+            <a:off x="8856469" y="2274458"/>
+            <a:ext cx="2924053" cy="738664"/>
+          </a:xfrm>
+          <a:prstGeom prst="rect">
+            <a:avLst/>
+          </a:prstGeom>
+          <a:noFill/>
+        </p:spPr>
+        <p:txBody>
+          <a:bodyPr wrap="square" rtlCol="0">
+            <a:spAutoFit/>
+          </a:bodyPr>
+          <a:lstStyle/>
+          <a:p>
+            <a:r>
+              <a:rPr lang="en-US" sz="1400" b="1" dirty="0">
+                <a:solidFill>
+                  <a:schemeClr val="accent1"/>
+                </a:solidFill>
+                <a:latin typeface="Cambria" panose="02040503050406030204" pitchFamily="18" charset="0"/>
+              </a:rPr>
+              <a:t>“</a:t>
+            </a:r>
+            <a:r>
+              <a:rPr lang="en-US" sz="1400" b="1" dirty="0">
+                <a:solidFill>
+                  <a:schemeClr val="accent1"/>
+                </a:solidFill>
+                <a:latin typeface="Cambria" panose="02040503050406030204" pitchFamily="18" charset="0"/>
+              </a:rPr>
+              <a:t>main“ code to be run and uploaded to the board.</a:t>
+            </a:r>
+          </a:p>
+          <a:p>
+            <a:r>
+              <a:rPr lang="en-US" sz="1400" b="1" dirty="0">
+                <a:solidFill>
+                  <a:schemeClr val="accent1"/>
+                </a:solidFill>
+                <a:latin typeface="Cambria" panose="02040503050406030204" pitchFamily="18" charset="0"/>
+              </a:rPr>
+              <a:t>Here the “Hello world” of IoT</a:t>
+            </a:r>
+            <a:r>
+              <a:rPr lang="en-US" sz="1400" b="1" dirty="0">
+                <a:solidFill>
+                  <a:schemeClr val="accent1"/>
+                </a:solidFill>
+                <a:latin typeface="Cambria" panose="02040503050406030204" pitchFamily="18" charset="0"/>
+              </a:rPr>
+              <a:t> </a:t>
+            </a:r>
+            <a:endParaRPr lang="en-US" sz="1400" b="1" dirty="0">
+              <a:solidFill>
+                <a:srgbClr val="DF5327"/>
+              </a:solidFill>
+              <a:latin typeface="Cambria" panose="02040503050406030204" pitchFamily="18" charset="0"/>
+            </a:endParaRPr>
+          </a:p>
+        </p:txBody>
+      </p:sp>
+      <p:sp>
+        <p:nvSpPr>
+          <p:cNvPr id="12" name="Rectangle 11"/>
+          <p:cNvSpPr/>
+          <p:nvPr/>
+        </p:nvSpPr>
+        <p:spPr>
+          <a:xfrm>
+            <a:off x="2069069" y="6135461"/>
+            <a:ext cx="8937300" cy="369332"/>
+          </a:xfrm>
+          <a:prstGeom prst="rect">
+            <a:avLst/>
+          </a:prstGeom>
+        </p:spPr>
+        <p:txBody>
+          <a:bodyPr wrap="square">
+            <a:spAutoFit/>
+          </a:bodyPr>
+          <a:lstStyle/>
+          <a:p>
+            <a:r>
+              <a:rPr lang="en-US">
+                <a:hlinkClick r:id="rId4"/>
+              </a:rPr>
+              <a:t>https://github.com/franckalbinet/iot-nbtc-itu/blob/gh-pages/labs/LED.md</a:t>
+            </a:r>
+            <a:endParaRPr lang="en-US"/>
           </a:p>
         </p:txBody>
       </p:sp>
     </p:spTree>
     <p:extLst>
       <p:ext uri="{BB962C8B-B14F-4D97-AF65-F5344CB8AC3E}">
-        <p14:creationId xmlns:p14="http://schemas.microsoft.com/office/powerpoint/2010/main" val="3105801543"/>
+        <p14:creationId xmlns:p14="http://schemas.microsoft.com/office/powerpoint/2010/main" val="1059112606"/>
       </p:ext>
     </p:extLst>
   </p:cSld>
   <p:clrMapOvr>
     <a:masterClrMapping/>
   </p:clrMapOvr>
-  <p:timing>
-    <p:tnLst>
-      <p:par>
-        <p:cTn xmlns:p14="http://schemas.microsoft.com/office/powerpoint/2010/main" id="1" dur="indefinite" restart="never" nodeType="tmRoot"/>
-      </p:par>
-    </p:tnLst>
-  </p:timing>
+</p:sld>
+</file>
+
+<file path=ppt/slides/slide27.xml><?xml version="1.0" encoding="utf-8"?>
+<p:sld xmlns:a="http://schemas.openxmlformats.org/drawingml/2006/main" xmlns:r="http://schemas.openxmlformats.org/officeDocument/2006/relationships" xmlns:p="http://schemas.openxmlformats.org/presentationml/2006/main">
+  <p:cSld>
+    <p:spTree>
+      <p:nvGrpSpPr>
+        <p:cNvPr id="1" name=""/>
+        <p:cNvGrpSpPr/>
+        <p:nvPr/>
+      </p:nvGrpSpPr>
+      <p:grpSpPr>
+        <a:xfrm>
+          <a:off x="0" y="0"/>
+          <a:ext cx="0" cy="0"/>
+          <a:chOff x="0" y="0"/>
+          <a:chExt cx="0" cy="0"/>
+        </a:xfrm>
+      </p:grpSpPr>
+      <p:sp>
+        <p:nvSpPr>
+          <p:cNvPr id="4" name="TextBox 3"/>
+          <p:cNvSpPr txBox="1"/>
+          <p:nvPr/>
+        </p:nvSpPr>
+        <p:spPr>
+          <a:xfrm>
+            <a:off x="1951685" y="435184"/>
+            <a:ext cx="9324671" cy="1015663"/>
+          </a:xfrm>
+          <a:prstGeom prst="rect">
+            <a:avLst/>
+          </a:prstGeom>
+          <a:noFill/>
+        </p:spPr>
+        <p:txBody>
+          <a:bodyPr wrap="square" rtlCol="0">
+            <a:spAutoFit/>
+          </a:bodyPr>
+          <a:lstStyle/>
+          <a:p>
+            <a:r>
+              <a:rPr lang="en-US" sz="3000" b="1" dirty="0">
+                <a:solidFill>
+                  <a:schemeClr val="accent1"/>
+                </a:solidFill>
+                <a:latin typeface="Cambria" panose="02040503050406030204" pitchFamily="18" charset="0"/>
+              </a:rPr>
+              <a:t>10. RUN FOR DEBUGGING PURPOSE</a:t>
+            </a:r>
+          </a:p>
+          <a:p>
+            <a:endParaRPr lang="en-US" sz="3000" b="1" dirty="0">
+              <a:solidFill>
+                <a:schemeClr val="accent1"/>
+              </a:solidFill>
+              <a:latin typeface="Cambria" panose="02040503050406030204" pitchFamily="18" charset="0"/>
+            </a:endParaRPr>
+          </a:p>
+        </p:txBody>
+      </p:sp>
+      <p:pic>
+        <p:nvPicPr>
+          <p:cNvPr id="2" name="Picture 1"/>
+          <p:cNvPicPr>
+            <a:picLocks noChangeAspect="1"/>
+          </p:cNvPicPr>
+          <p:nvPr/>
+        </p:nvPicPr>
+        <p:blipFill>
+          <a:blip r:embed="rId2"/>
+          <a:stretch>
+            <a:fillRect/>
+          </a:stretch>
+        </p:blipFill>
+        <p:spPr>
+          <a:xfrm>
+            <a:off x="2090151" y="1682251"/>
+            <a:ext cx="9683487" cy="2882031"/>
+          </a:xfrm>
+          <a:prstGeom prst="rect">
+            <a:avLst/>
+          </a:prstGeom>
+        </p:spPr>
+      </p:pic>
+      <p:sp>
+        <p:nvSpPr>
+          <p:cNvPr id="9" name="Oval 8"/>
+          <p:cNvSpPr/>
+          <p:nvPr/>
+        </p:nvSpPr>
+        <p:spPr>
+          <a:xfrm>
+            <a:off x="10040666" y="1927248"/>
+            <a:ext cx="873102" cy="546725"/>
+          </a:xfrm>
+          <a:prstGeom prst="ellipse">
+            <a:avLst/>
+          </a:prstGeom>
+          <a:noFill/>
+          <a:ln w="38100" cmpd="sng">
+            <a:solidFill>
+              <a:srgbClr val="FF0000"/>
+            </a:solidFill>
+          </a:ln>
+        </p:spPr>
+        <p:style>
+          <a:lnRef idx="1">
+            <a:schemeClr val="accent1"/>
+          </a:lnRef>
+          <a:fillRef idx="3">
+            <a:schemeClr val="accent1"/>
+          </a:fillRef>
+          <a:effectRef idx="2">
+            <a:schemeClr val="accent1"/>
+          </a:effectRef>
+          <a:fontRef idx="minor">
+            <a:schemeClr val="lt1"/>
+          </a:fontRef>
+        </p:style>
+        <p:txBody>
+          <a:bodyPr rtlCol="0" anchor="ctr"/>
+          <a:lstStyle/>
+          <a:p>
+            <a:pPr algn="ctr"/>
+            <a:endParaRPr lang="en-US"/>
+          </a:p>
+        </p:txBody>
+      </p:sp>
+    </p:spTree>
+    <p:extLst>
+      <p:ext uri="{BB962C8B-B14F-4D97-AF65-F5344CB8AC3E}">
+        <p14:creationId xmlns:p14="http://schemas.microsoft.com/office/powerpoint/2010/main" val="827093320"/>
+      </p:ext>
+    </p:extLst>
+  </p:cSld>
+  <p:clrMapOvr>
+    <a:masterClrMapping/>
+  </p:clrMapOvr>
+</p:sld>
+</file>
+
+<file path=ppt/slides/slide28.xml><?xml version="1.0" encoding="utf-8"?>
+<p:sld xmlns:a="http://schemas.openxmlformats.org/drawingml/2006/main" xmlns:r="http://schemas.openxmlformats.org/officeDocument/2006/relationships" xmlns:p="http://schemas.openxmlformats.org/presentationml/2006/main">
+  <p:cSld>
+    <p:spTree>
+      <p:nvGrpSpPr>
+        <p:cNvPr id="1" name=""/>
+        <p:cNvGrpSpPr/>
+        <p:nvPr/>
+      </p:nvGrpSpPr>
+      <p:grpSpPr>
+        <a:xfrm>
+          <a:off x="0" y="0"/>
+          <a:ext cx="0" cy="0"/>
+          <a:chOff x="0" y="0"/>
+          <a:chExt cx="0" cy="0"/>
+        </a:xfrm>
+      </p:grpSpPr>
+      <p:sp>
+        <p:nvSpPr>
+          <p:cNvPr id="4" name="TextBox 3"/>
+          <p:cNvSpPr txBox="1"/>
+          <p:nvPr/>
+        </p:nvSpPr>
+        <p:spPr>
+          <a:xfrm>
+            <a:off x="1951685" y="435184"/>
+            <a:ext cx="9324671" cy="1015663"/>
+          </a:xfrm>
+          <a:prstGeom prst="rect">
+            <a:avLst/>
+          </a:prstGeom>
+          <a:noFill/>
+        </p:spPr>
+        <p:txBody>
+          <a:bodyPr wrap="square" rtlCol="0">
+            <a:spAutoFit/>
+          </a:bodyPr>
+          <a:lstStyle/>
+          <a:p>
+            <a:r>
+              <a:rPr lang="en-US" sz="3000" b="1" dirty="0">
+                <a:solidFill>
+                  <a:schemeClr val="accent1"/>
+                </a:solidFill>
+                <a:latin typeface="Cambria" panose="02040503050406030204" pitchFamily="18" charset="0"/>
+              </a:rPr>
+              <a:t>11. HALTING EXECUTION, RESETTING</a:t>
+            </a:r>
+          </a:p>
+          <a:p>
+            <a:endParaRPr lang="en-US" sz="3000" b="1" dirty="0">
+              <a:solidFill>
+                <a:schemeClr val="accent1"/>
+              </a:solidFill>
+              <a:latin typeface="Cambria" panose="02040503050406030204" pitchFamily="18" charset="0"/>
+            </a:endParaRPr>
+          </a:p>
+        </p:txBody>
+      </p:sp>
+      <p:pic>
+        <p:nvPicPr>
+          <p:cNvPr id="3" name="Picture 2"/>
+          <p:cNvPicPr>
+            <a:picLocks noChangeAspect="1"/>
+          </p:cNvPicPr>
+          <p:nvPr/>
+        </p:nvPicPr>
+        <p:blipFill>
+          <a:blip r:embed="rId2"/>
+          <a:stretch>
+            <a:fillRect/>
+          </a:stretch>
+        </p:blipFill>
+        <p:spPr>
+          <a:xfrm>
+            <a:off x="2080668" y="1590132"/>
+            <a:ext cx="7647578" cy="2630175"/>
+          </a:xfrm>
+          <a:prstGeom prst="rect">
+            <a:avLst/>
+          </a:prstGeom>
+        </p:spPr>
+      </p:pic>
+      <p:sp>
+        <p:nvSpPr>
+          <p:cNvPr id="7" name="TextBox 6"/>
+          <p:cNvSpPr txBox="1"/>
+          <p:nvPr/>
+        </p:nvSpPr>
+        <p:spPr>
+          <a:xfrm>
+            <a:off x="2077628" y="1222614"/>
+            <a:ext cx="2221735" cy="307777"/>
+          </a:xfrm>
+          <a:prstGeom prst="rect">
+            <a:avLst/>
+          </a:prstGeom>
+          <a:noFill/>
+        </p:spPr>
+        <p:txBody>
+          <a:bodyPr wrap="square" rtlCol="0">
+            <a:spAutoFit/>
+          </a:bodyPr>
+          <a:lstStyle/>
+          <a:p>
+            <a:r>
+              <a:rPr lang="en-US" sz="1400" b="1" dirty="0">
+                <a:solidFill>
+                  <a:schemeClr val="accent1"/>
+                </a:solidFill>
+                <a:latin typeface="Cambria" panose="02040503050406030204" pitchFamily="18" charset="0"/>
+              </a:rPr>
+              <a:t>In Atom |Global settings</a:t>
+            </a:r>
+          </a:p>
+        </p:txBody>
+      </p:sp>
+      <p:pic>
+        <p:nvPicPr>
+          <p:cNvPr id="5" name="Picture 4"/>
+          <p:cNvPicPr>
+            <a:picLocks noChangeAspect="1"/>
+          </p:cNvPicPr>
+          <p:nvPr/>
+        </p:nvPicPr>
+        <p:blipFill>
+          <a:blip r:embed="rId3"/>
+          <a:stretch>
+            <a:fillRect/>
+          </a:stretch>
+        </p:blipFill>
+        <p:spPr>
+          <a:xfrm>
+            <a:off x="1962232" y="4905486"/>
+            <a:ext cx="2235200" cy="1651000"/>
+          </a:xfrm>
+          <a:prstGeom prst="rect">
+            <a:avLst/>
+          </a:prstGeom>
+        </p:spPr>
+      </p:pic>
+      <p:sp>
+        <p:nvSpPr>
+          <p:cNvPr id="10" name="TextBox 9"/>
+          <p:cNvSpPr txBox="1"/>
+          <p:nvPr/>
+        </p:nvSpPr>
+        <p:spPr>
+          <a:xfrm>
+            <a:off x="2110969" y="4629546"/>
+            <a:ext cx="2221735" cy="307777"/>
+          </a:xfrm>
+          <a:prstGeom prst="rect">
+            <a:avLst/>
+          </a:prstGeom>
+          <a:noFill/>
+        </p:spPr>
+        <p:txBody>
+          <a:bodyPr wrap="square" rtlCol="0">
+            <a:spAutoFit/>
+          </a:bodyPr>
+          <a:lstStyle/>
+          <a:p>
+            <a:r>
+              <a:rPr lang="en-US" sz="1400" b="1" dirty="0">
+                <a:solidFill>
+                  <a:schemeClr val="accent1"/>
+                </a:solidFill>
+                <a:latin typeface="Cambria" panose="02040503050406030204" pitchFamily="18" charset="0"/>
+              </a:rPr>
+              <a:t>Hard reset button</a:t>
+            </a:r>
+          </a:p>
+        </p:txBody>
+      </p:sp>
+      <p:sp>
+        <p:nvSpPr>
+          <p:cNvPr id="11" name="Oval 10"/>
+          <p:cNvSpPr/>
+          <p:nvPr/>
+        </p:nvSpPr>
+        <p:spPr>
+          <a:xfrm>
+            <a:off x="2301813" y="5794655"/>
+            <a:ext cx="529152" cy="396894"/>
+          </a:xfrm>
+          <a:prstGeom prst="ellipse">
+            <a:avLst/>
+          </a:prstGeom>
+          <a:noFill/>
+          <a:ln w="38100" cmpd="sng">
+            <a:solidFill>
+              <a:srgbClr val="FF0000"/>
+            </a:solidFill>
+          </a:ln>
+        </p:spPr>
+        <p:style>
+          <a:lnRef idx="1">
+            <a:schemeClr val="accent1"/>
+          </a:lnRef>
+          <a:fillRef idx="3">
+            <a:schemeClr val="accent1"/>
+          </a:fillRef>
+          <a:effectRef idx="2">
+            <a:schemeClr val="accent1"/>
+          </a:effectRef>
+          <a:fontRef idx="minor">
+            <a:schemeClr val="lt1"/>
+          </a:fontRef>
+        </p:style>
+        <p:txBody>
+          <a:bodyPr rtlCol="0" anchor="ctr"/>
+          <a:lstStyle/>
+          <a:p>
+            <a:pPr algn="ctr"/>
+            <a:endParaRPr lang="en-US"/>
+          </a:p>
+        </p:txBody>
+      </p:sp>
+    </p:spTree>
+    <p:extLst>
+      <p:ext uri="{BB962C8B-B14F-4D97-AF65-F5344CB8AC3E}">
+        <p14:creationId xmlns:p14="http://schemas.microsoft.com/office/powerpoint/2010/main" val="1939676544"/>
+      </p:ext>
+    </p:extLst>
+  </p:cSld>
+  <p:clrMapOvr>
+    <a:masterClrMapping/>
+  </p:clrMapOvr>
+</p:sld>
+</file>
+
+<file path=ppt/slides/slide29.xml><?xml version="1.0" encoding="utf-8"?>
+<p:sld xmlns:a="http://schemas.openxmlformats.org/drawingml/2006/main" xmlns:r="http://schemas.openxmlformats.org/officeDocument/2006/relationships" xmlns:p="http://schemas.openxmlformats.org/presentationml/2006/main">
+  <p:cSld>
+    <p:spTree>
+      <p:nvGrpSpPr>
+        <p:cNvPr id="1" name=""/>
+        <p:cNvGrpSpPr/>
+        <p:nvPr/>
+      </p:nvGrpSpPr>
+      <p:grpSpPr>
+        <a:xfrm>
+          <a:off x="0" y="0"/>
+          <a:ext cx="0" cy="0"/>
+          <a:chOff x="0" y="0"/>
+          <a:chExt cx="0" cy="0"/>
+        </a:xfrm>
+      </p:grpSpPr>
+      <p:sp>
+        <p:nvSpPr>
+          <p:cNvPr id="4" name="TextBox 3"/>
+          <p:cNvSpPr txBox="1"/>
+          <p:nvPr/>
+        </p:nvSpPr>
+        <p:spPr>
+          <a:xfrm>
+            <a:off x="1951685" y="435184"/>
+            <a:ext cx="9324671" cy="553998"/>
+          </a:xfrm>
+          <a:prstGeom prst="rect">
+            <a:avLst/>
+          </a:prstGeom>
+          <a:noFill/>
+        </p:spPr>
+        <p:txBody>
+          <a:bodyPr wrap="square" rtlCol="0">
+            <a:spAutoFit/>
+          </a:bodyPr>
+          <a:lstStyle/>
+          <a:p>
+            <a:r>
+              <a:rPr lang="en-US" sz="3000" b="1" dirty="0">
+                <a:solidFill>
+                  <a:schemeClr val="accent1"/>
+                </a:solidFill>
+                <a:latin typeface="Cambria" panose="02040503050406030204" pitchFamily="18" charset="0"/>
+              </a:rPr>
+              <a:t>12. SYNC/UPLOADING CODE TO THE BOARD</a:t>
+            </a:r>
+            <a:endParaRPr lang="en-US" sz="3000" b="1" dirty="0">
+              <a:solidFill>
+                <a:schemeClr val="accent1"/>
+              </a:solidFill>
+              <a:latin typeface="Cambria" panose="02040503050406030204" pitchFamily="18" charset="0"/>
+            </a:endParaRPr>
+          </a:p>
+        </p:txBody>
+      </p:sp>
+      <p:pic>
+        <p:nvPicPr>
+          <p:cNvPr id="2" name="Picture 1"/>
+          <p:cNvPicPr>
+            <a:picLocks noChangeAspect="1"/>
+          </p:cNvPicPr>
+          <p:nvPr/>
+        </p:nvPicPr>
+        <p:blipFill>
+          <a:blip r:embed="rId2"/>
+          <a:stretch>
+            <a:fillRect/>
+          </a:stretch>
+        </p:blipFill>
+        <p:spPr>
+          <a:xfrm>
+            <a:off x="2063694" y="1930400"/>
+            <a:ext cx="9630571" cy="2360917"/>
+          </a:xfrm>
+          <a:prstGeom prst="rect">
+            <a:avLst/>
+          </a:prstGeom>
+        </p:spPr>
+      </p:pic>
+      <p:sp>
+        <p:nvSpPr>
+          <p:cNvPr id="5" name="Oval 4"/>
+          <p:cNvSpPr/>
+          <p:nvPr/>
+        </p:nvSpPr>
+        <p:spPr>
+          <a:xfrm>
+            <a:off x="8678099" y="2086006"/>
+            <a:ext cx="873102" cy="546725"/>
+          </a:xfrm>
+          <a:prstGeom prst="ellipse">
+            <a:avLst/>
+          </a:prstGeom>
+          <a:noFill/>
+          <a:ln w="38100" cmpd="sng">
+            <a:solidFill>
+              <a:srgbClr val="FF0000"/>
+            </a:solidFill>
+          </a:ln>
+        </p:spPr>
+        <p:style>
+          <a:lnRef idx="1">
+            <a:schemeClr val="accent1"/>
+          </a:lnRef>
+          <a:fillRef idx="3">
+            <a:schemeClr val="accent1"/>
+          </a:fillRef>
+          <a:effectRef idx="2">
+            <a:schemeClr val="accent1"/>
+          </a:effectRef>
+          <a:fontRef idx="minor">
+            <a:schemeClr val="lt1"/>
+          </a:fontRef>
+        </p:style>
+        <p:txBody>
+          <a:bodyPr rtlCol="0" anchor="ctr"/>
+          <a:lstStyle/>
+          <a:p>
+            <a:pPr algn="ctr"/>
+            <a:endParaRPr lang="en-US"/>
+          </a:p>
+        </p:txBody>
+      </p:sp>
+    </p:spTree>
+    <p:extLst>
+      <p:ext uri="{BB962C8B-B14F-4D97-AF65-F5344CB8AC3E}">
+        <p14:creationId xmlns:p14="http://schemas.microsoft.com/office/powerpoint/2010/main" val="4023914100"/>
+      </p:ext>
+    </p:extLst>
+  </p:cSld>
+  <p:clrMapOvr>
+    <a:masterClrMapping/>
+  </p:clrMapOvr>
 </p:sld>
 </file>
 
@@ -6722,6 +7482,79 @@
       </p:transition>
     </mc:Fallback>
   </mc:AlternateContent>
+  <p:timing>
+    <p:tnLst>
+      <p:par>
+        <p:cTn xmlns:p14="http://schemas.microsoft.com/office/powerpoint/2010/main" id="1" dur="indefinite" restart="never" nodeType="tmRoot"/>
+      </p:par>
+    </p:tnLst>
+  </p:timing>
+</p:sld>
+</file>
+
+<file path=ppt/slides/slide30.xml><?xml version="1.0" encoding="utf-8"?>
+<p:sld xmlns:a="http://schemas.openxmlformats.org/drawingml/2006/main" xmlns:r="http://schemas.openxmlformats.org/officeDocument/2006/relationships" xmlns:p="http://schemas.openxmlformats.org/presentationml/2006/main">
+  <p:cSld>
+    <p:spTree>
+      <p:nvGrpSpPr>
+        <p:cNvPr id="1" name=""/>
+        <p:cNvGrpSpPr/>
+        <p:nvPr/>
+      </p:nvGrpSpPr>
+      <p:grpSpPr>
+        <a:xfrm>
+          <a:off x="0" y="0"/>
+          <a:ext cx="0" cy="0"/>
+          <a:chOff x="0" y="0"/>
+          <a:chExt cx="0" cy="0"/>
+        </a:xfrm>
+      </p:grpSpPr>
+      <p:sp>
+        <p:nvSpPr>
+          <p:cNvPr id="2" name="Title 1"/>
+          <p:cNvSpPr>
+            <a:spLocks noGrp="1"/>
+          </p:cNvSpPr>
+          <p:nvPr>
+            <p:ph type="title"/>
+          </p:nvPr>
+        </p:nvSpPr>
+        <p:spPr>
+          <a:xfrm>
+            <a:off x="1058333" y="2874439"/>
+            <a:ext cx="5036820" cy="807721"/>
+          </a:xfrm>
+        </p:spPr>
+        <p:txBody>
+          <a:bodyPr/>
+          <a:lstStyle/>
+          <a:p>
+            <a:r>
+              <a:rPr lang="en-US" dirty="0" smtClean="0">
+                <a:solidFill>
+                  <a:schemeClr val="accent1"/>
+                </a:solidFill>
+              </a:rPr>
+              <a:t>THANK YOU</a:t>
+            </a:r>
+            <a:endParaRPr lang="en-US" dirty="0">
+              <a:solidFill>
+                <a:schemeClr val="accent1"/>
+              </a:solidFill>
+            </a:endParaRPr>
+          </a:p>
+        </p:txBody>
+      </p:sp>
+    </p:spTree>
+    <p:extLst>
+      <p:ext uri="{BB962C8B-B14F-4D97-AF65-F5344CB8AC3E}">
+        <p14:creationId xmlns:p14="http://schemas.microsoft.com/office/powerpoint/2010/main" val="3105801543"/>
+      </p:ext>
+    </p:extLst>
+  </p:cSld>
+  <p:clrMapOvr>
+    <a:masterClrMapping/>
+  </p:clrMapOvr>
   <p:timing>
     <p:tnLst>
       <p:par>

</xml_diff>